<commit_message>
updated slides after Feb28 meeting
</commit_message>
<xml_diff>
--- a/Presentation.pptx
+++ b/Presentation.pptx
@@ -5,7 +5,7 @@
     <p:sldMasterId id="2147483659" r:id="rId1"/>
   </p:sldMasterIdLst>
   <p:notesMasterIdLst>
-    <p:notesMasterId r:id="rId23"/>
+    <p:notesMasterId r:id="rId24"/>
   </p:notesMasterIdLst>
   <p:sldIdLst>
     <p:sldId id="256" r:id="rId2"/>
@@ -24,11 +24,12 @@
     <p:sldId id="269" r:id="rId15"/>
     <p:sldId id="270" r:id="rId16"/>
     <p:sldId id="271" r:id="rId17"/>
-    <p:sldId id="272" r:id="rId18"/>
-    <p:sldId id="273" r:id="rId19"/>
-    <p:sldId id="274" r:id="rId20"/>
-    <p:sldId id="275" r:id="rId21"/>
-    <p:sldId id="276" r:id="rId22"/>
+    <p:sldId id="278" r:id="rId18"/>
+    <p:sldId id="272" r:id="rId19"/>
+    <p:sldId id="273" r:id="rId20"/>
+    <p:sldId id="274" r:id="rId21"/>
+    <p:sldId id="275" r:id="rId22"/>
+    <p:sldId id="276" r:id="rId23"/>
   </p:sldIdLst>
   <p:sldSz cx="9144000" cy="5143500" type="screen16x9"/>
   <p:notesSz cx="6858000" cy="9144000"/>
@@ -958,7 +959,7 @@
         </p:nvSpPr>
         <p:spPr>
           <a:xfrm>
-            <a:off x="381300" y="685800"/>
+            <a:off x="381000" y="685800"/>
             <a:ext cx="6096000" cy="3429000"/>
           </a:xfrm>
           <a:custGeom>
@@ -1062,7 +1063,7 @@
         </p:nvSpPr>
         <p:spPr>
           <a:xfrm>
-            <a:off x="381300" y="685800"/>
+            <a:off x="381000" y="685800"/>
             <a:ext cx="6096000" cy="3429000"/>
           </a:xfrm>
           <a:custGeom>
@@ -1166,7 +1167,7 @@
         </p:nvSpPr>
         <p:spPr>
           <a:xfrm>
-            <a:off x="381300" y="685800"/>
+            <a:off x="381000" y="685800"/>
             <a:ext cx="6096000" cy="3429000"/>
           </a:xfrm>
           <a:custGeom>
@@ -1270,7 +1271,7 @@
         </p:nvSpPr>
         <p:spPr>
           <a:xfrm>
-            <a:off x="381300" y="685800"/>
+            <a:off x="381000" y="685800"/>
             <a:ext cx="6096000" cy="3429000"/>
           </a:xfrm>
           <a:custGeom>
@@ -1374,7 +1375,7 @@
         </p:nvSpPr>
         <p:spPr>
           <a:xfrm>
-            <a:off x="381300" y="685800"/>
+            <a:off x="381000" y="685800"/>
             <a:ext cx="6096000" cy="3429000"/>
           </a:xfrm>
           <a:custGeom>
@@ -1478,7 +1479,7 @@
         </p:nvSpPr>
         <p:spPr>
           <a:xfrm>
-            <a:off x="381300" y="685800"/>
+            <a:off x="381000" y="685800"/>
             <a:ext cx="6096000" cy="3429000"/>
           </a:xfrm>
           <a:custGeom>
@@ -1582,7 +1583,7 @@
         </p:nvSpPr>
         <p:spPr>
           <a:xfrm>
-            <a:off x="381300" y="685800"/>
+            <a:off x="381000" y="685800"/>
             <a:ext cx="6096000" cy="3429000"/>
           </a:xfrm>
           <a:custGeom>
@@ -2622,7 +2623,7 @@
         </p:nvSpPr>
         <p:spPr>
           <a:xfrm>
-            <a:off x="381300" y="685800"/>
+            <a:off x="381000" y="685800"/>
             <a:ext cx="6096000" cy="3429000"/>
           </a:xfrm>
           <a:custGeom>
@@ -2726,7 +2727,7 @@
         </p:nvSpPr>
         <p:spPr>
           <a:xfrm>
-            <a:off x="381300" y="685800"/>
+            <a:off x="381000" y="685800"/>
             <a:ext cx="6096000" cy="3429000"/>
           </a:xfrm>
           <a:custGeom>
@@ -7603,10 +7604,10 @@
               <a:buNone/>
             </a:pPr>
             <a:r>
-              <a:rPr lang="en" sz="3280"/>
+              <a:rPr lang="en" sz="3280" dirty="0"/>
               <a:t>Deep Reinforcement Learning using Attention Augmented Agents</a:t>
             </a:r>
-            <a:endParaRPr sz="3280"/>
+            <a:endParaRPr sz="3280" dirty="0"/>
           </a:p>
         </p:txBody>
       </p:sp>
@@ -7760,48 +7761,175 @@
               <a:buNone/>
             </a:pPr>
             <a:r>
-              <a:rPr lang="en"/>
-              <a:t>Skip connections: Residual Blocks</a:t>
+              <a:rPr lang="en" dirty="0"/>
+              <a:t>Skip connections: Residual Blocks in Feed Forward Nets</a:t>
             </a:r>
-            <a:endParaRPr/>
+            <a:endParaRPr dirty="0"/>
+          </a:p>
+        </p:txBody>
+      </p:sp>
+      <p:pic>
+        <p:nvPicPr>
+          <p:cNvPr id="3" name="Picture 2">
+            <a:extLst>
+              <a:ext uri="{FF2B5EF4-FFF2-40B4-BE49-F238E27FC236}">
+                <a16:creationId xmlns:a16="http://schemas.microsoft.com/office/drawing/2014/main" id="{EC14DF9A-8822-4F7B-80CC-ED3AC9B36D4C}"/>
+              </a:ext>
+            </a:extLst>
+          </p:cNvPr>
+          <p:cNvPicPr>
+            <a:picLocks noChangeAspect="1"/>
+          </p:cNvPicPr>
+          <p:nvPr/>
+        </p:nvPicPr>
+        <p:blipFill>
+          <a:blip r:embed="rId3"/>
+          <a:stretch>
+            <a:fillRect/>
+          </a:stretch>
+        </p:blipFill>
+        <p:spPr>
+          <a:xfrm>
+            <a:off x="4329059" y="1565817"/>
+            <a:ext cx="4503241" cy="2041379"/>
+          </a:xfrm>
+          <a:prstGeom prst="rect">
+            <a:avLst/>
+          </a:prstGeom>
+        </p:spPr>
+      </p:pic>
+      <p:sp>
+        <p:nvSpPr>
+          <p:cNvPr id="4" name="TextBox 3">
+            <a:extLst>
+              <a:ext uri="{FF2B5EF4-FFF2-40B4-BE49-F238E27FC236}">
+                <a16:creationId xmlns:a16="http://schemas.microsoft.com/office/drawing/2014/main" id="{A1634E18-9517-4E47-A3D3-38CB73B95365}"/>
+              </a:ext>
+            </a:extLst>
+          </p:cNvPr>
+          <p:cNvSpPr txBox="1"/>
+          <p:nvPr/>
+        </p:nvSpPr>
+        <p:spPr>
+          <a:xfrm>
+            <a:off x="4846731" y="4436865"/>
+            <a:ext cx="3471862" cy="261610"/>
+          </a:xfrm>
+          <a:prstGeom prst="rect">
+            <a:avLst/>
+          </a:prstGeom>
+          <a:noFill/>
+        </p:spPr>
+        <p:txBody>
+          <a:bodyPr wrap="square" rtlCol="0">
+            <a:spAutoFit/>
+          </a:bodyPr>
+          <a:lstStyle/>
+          <a:p>
+            <a:r>
+              <a:rPr lang="en-US" sz="1050" dirty="0"/>
+              <a:t>Li et. al. Visualizing the Loss Landscape of Neural Nets</a:t>
+            </a:r>
+          </a:p>
+        </p:txBody>
+      </p:sp>
+      <p:pic>
+        <p:nvPicPr>
+          <p:cNvPr id="6" name="Picture 5">
+            <a:extLst>
+              <a:ext uri="{FF2B5EF4-FFF2-40B4-BE49-F238E27FC236}">
+                <a16:creationId xmlns:a16="http://schemas.microsoft.com/office/drawing/2014/main" id="{213E419A-39EE-491C-B73C-5C9BC2E3C7D0}"/>
+              </a:ext>
+            </a:extLst>
+          </p:cNvPr>
+          <p:cNvPicPr>
+            <a:picLocks noChangeAspect="1"/>
+          </p:cNvPicPr>
+          <p:nvPr/>
+        </p:nvPicPr>
+        <p:blipFill>
+          <a:blip r:embed="rId4"/>
+          <a:stretch>
+            <a:fillRect/>
+          </a:stretch>
+        </p:blipFill>
+        <p:spPr>
+          <a:xfrm>
+            <a:off x="89632" y="1498673"/>
+            <a:ext cx="3836805" cy="2176462"/>
+          </a:xfrm>
+          <a:prstGeom prst="rect">
+            <a:avLst/>
+          </a:prstGeom>
+        </p:spPr>
+      </p:pic>
+      <p:sp>
+        <p:nvSpPr>
+          <p:cNvPr id="9" name="TextBox 8">
+            <a:extLst>
+              <a:ext uri="{FF2B5EF4-FFF2-40B4-BE49-F238E27FC236}">
+                <a16:creationId xmlns:a16="http://schemas.microsoft.com/office/drawing/2014/main" id="{7B516EF5-1DEC-44CB-BC00-7932563043B5}"/>
+              </a:ext>
+            </a:extLst>
+          </p:cNvPr>
+          <p:cNvSpPr txBox="1"/>
+          <p:nvPr/>
+        </p:nvSpPr>
+        <p:spPr>
+          <a:xfrm>
+            <a:off x="200665" y="4436865"/>
+            <a:ext cx="3614738" cy="261610"/>
+          </a:xfrm>
+          <a:prstGeom prst="rect">
+            <a:avLst/>
+          </a:prstGeom>
+          <a:noFill/>
+        </p:spPr>
+        <p:txBody>
+          <a:bodyPr wrap="square" rtlCol="0">
+            <a:spAutoFit/>
+          </a:bodyPr>
+          <a:lstStyle/>
+          <a:p>
+            <a:r>
+              <a:rPr lang="en-US" sz="1050" dirty="0"/>
+              <a:t>He et. al. Deep Residual Learning for Image Recognition</a:t>
+            </a:r>
           </a:p>
         </p:txBody>
       </p:sp>
       <p:sp>
         <p:nvSpPr>
-          <p:cNvPr id="109" name="Google Shape;109;p22"/>
-          <p:cNvSpPr txBox="1">
-            <a:spLocks noGrp="1"/>
-          </p:cNvSpPr>
-          <p:nvPr>
-            <p:ph type="body" idx="1"/>
-          </p:nvPr>
+          <p:cNvPr id="7" name="TextBox 6">
+            <a:extLst>
+              <a:ext uri="{FF2B5EF4-FFF2-40B4-BE49-F238E27FC236}">
+                <a16:creationId xmlns:a16="http://schemas.microsoft.com/office/drawing/2014/main" id="{1D2B473A-472C-4A03-B85F-D27C8242D714}"/>
+              </a:ext>
+            </a:extLst>
+          </p:cNvPr>
+          <p:cNvSpPr txBox="1"/>
+          <p:nvPr/>
         </p:nvSpPr>
         <p:spPr>
           <a:xfrm>
-            <a:off x="311700" y="1152475"/>
-            <a:ext cx="8520600" cy="3416400"/>
+            <a:off x="352425" y="1104310"/>
+            <a:ext cx="7048500" cy="307777"/>
           </a:xfrm>
           <a:prstGeom prst="rect">
             <a:avLst/>
           </a:prstGeom>
+          <a:noFill/>
         </p:spPr>
         <p:txBody>
-          <a:bodyPr spcFirstLastPara="1" wrap="square" lIns="91425" tIns="91425" rIns="91425" bIns="91425" anchor="t" anchorCtr="0">
-            <a:normAutofit/>
+          <a:bodyPr wrap="square" rtlCol="0">
+            <a:spAutoFit/>
           </a:bodyPr>
           <a:lstStyle/>
           <a:p>
-            <a:pPr marL="0" lvl="0" indent="0" algn="l" rtl="0">
-              <a:spcBef>
-                <a:spcPts val="0"/>
-              </a:spcBef>
-              <a:spcAft>
-                <a:spcPts val="1200"/>
-              </a:spcAft>
-              <a:buNone/>
-            </a:pPr>
-            <a:endParaRPr/>
+            <a:r>
+              <a:rPr lang="en-US" dirty="0"/>
+              <a:t>Main Idea: Instead of approximating F(x), let feed forward part approximate F(x) - x</a:t>
+            </a:r>
           </a:p>
         </p:txBody>
       </p:sp>
@@ -7985,7 +8113,7 @@
         </p:nvGraphicFramePr>
         <p:xfrm>
           <a:off x="311700" y="1017725"/>
-          <a:ext cx="3000000" cy="3000000"/>
+          <a:ext cx="7239025" cy="2194410"/>
         </p:xfrm>
         <a:graphic>
           <a:graphicData uri="http://schemas.openxmlformats.org/drawingml/2006/table">
@@ -8040,10 +8168,10 @@
                         <a:buNone/>
                       </a:pPr>
                       <a:r>
-                        <a:rPr lang="en"/>
+                        <a:rPr lang="en" dirty="0"/>
                         <a:t>model name \ properties</a:t>
                       </a:r>
-                      <a:endParaRPr/>
+                      <a:endParaRPr dirty="0"/>
                     </a:p>
                   </a:txBody>
                   <a:tcPr marL="91425" marR="91425" marT="91425" marB="91425"/>
@@ -8505,10 +8633,10 @@
                         <a:buNone/>
                       </a:pPr>
                       <a:r>
-                        <a:rPr lang="en"/>
+                        <a:rPr lang="en" dirty="0"/>
                         <a:t>√</a:t>
                       </a:r>
-                      <a:endParaRPr/>
+                      <a:endParaRPr dirty="0"/>
                     </a:p>
                   </a:txBody>
                   <a:tcPr marL="91425" marR="91425" marT="91425" marB="91425"/>
@@ -8590,44 +8718,36 @@
           </a:p>
         </p:txBody>
       </p:sp>
-      <p:sp>
-        <p:nvSpPr>
-          <p:cNvPr id="127" name="Google Shape;127;p25"/>
-          <p:cNvSpPr txBox="1">
-            <a:spLocks noGrp="1"/>
-          </p:cNvSpPr>
-          <p:nvPr>
-            <p:ph type="body" idx="1"/>
-          </p:nvPr>
-        </p:nvSpPr>
+      <p:pic>
+        <p:nvPicPr>
+          <p:cNvPr id="7" name="Picture 6">
+            <a:extLst>
+              <a:ext uri="{FF2B5EF4-FFF2-40B4-BE49-F238E27FC236}">
+                <a16:creationId xmlns:a16="http://schemas.microsoft.com/office/drawing/2014/main" id="{5293F7C9-DD3C-4EB6-A6EA-E62A2BD23307}"/>
+              </a:ext>
+            </a:extLst>
+          </p:cNvPr>
+          <p:cNvPicPr>
+            <a:picLocks noChangeAspect="1"/>
+          </p:cNvPicPr>
+          <p:nvPr/>
+        </p:nvPicPr>
+        <p:blipFill>
+          <a:blip r:embed="rId3"/>
+          <a:stretch>
+            <a:fillRect/>
+          </a:stretch>
+        </p:blipFill>
         <p:spPr>
           <a:xfrm>
-            <a:off x="311700" y="1152475"/>
-            <a:ext cx="8520600" cy="3416400"/>
+            <a:off x="311700" y="1017724"/>
+            <a:ext cx="8809736" cy="4021101"/>
           </a:xfrm>
           <a:prstGeom prst="rect">
             <a:avLst/>
           </a:prstGeom>
         </p:spPr>
-        <p:txBody>
-          <a:bodyPr spcFirstLastPara="1" wrap="square" lIns="91425" tIns="91425" rIns="91425" bIns="91425" anchor="t" anchorCtr="0">
-            <a:normAutofit/>
-          </a:bodyPr>
-          <a:lstStyle/>
-          <a:p>
-            <a:pPr marL="0" lvl="0" indent="0" algn="l" rtl="0">
-              <a:spcBef>
-                <a:spcPts val="0"/>
-              </a:spcBef>
-              <a:spcAft>
-                <a:spcPts val="1200"/>
-              </a:spcAft>
-              <a:buNone/>
-            </a:pPr>
-            <a:endParaRPr/>
-          </a:p>
-        </p:txBody>
-      </p:sp>
+      </p:pic>
     </p:spTree>
   </p:cSld>
   <p:clrMapOvr>
@@ -8688,10 +8808,10 @@
               <a:buNone/>
             </a:pPr>
             <a:r>
-              <a:rPr lang="en"/>
-              <a:t>Model 2: Resnet-50</a:t>
+              <a:rPr lang="en" dirty="0"/>
+              <a:t>Model 2: Resnet-50 (Ted’s Model)</a:t>
             </a:r>
-            <a:endParaRPr/>
+            <a:endParaRPr dirty="0"/>
           </a:p>
         </p:txBody>
       </p:sp>
@@ -8793,10 +8913,10 @@
               <a:buNone/>
             </a:pPr>
             <a:r>
-              <a:rPr lang="en"/>
-              <a:t>Model 3: Attention</a:t>
+              <a:rPr lang="en" dirty="0"/>
+              <a:t>Model 3: Attention (Paper)</a:t>
             </a:r>
-            <a:endParaRPr/>
+            <a:endParaRPr dirty="0"/>
           </a:p>
         </p:txBody>
       </p:sp>
@@ -8834,7 +8954,91 @@
               </a:spcAft>
               <a:buNone/>
             </a:pPr>
-            <a:endParaRPr/>
+            <a:r>
+              <a:rPr lang="en-US" dirty="0"/>
+              <a:t>Mention paper and author</a:t>
+            </a:r>
+          </a:p>
+          <a:p>
+            <a:pPr marL="0" lvl="0" indent="0" algn="l" rtl="0">
+              <a:spcBef>
+                <a:spcPts val="0"/>
+              </a:spcBef>
+              <a:spcAft>
+                <a:spcPts val="1200"/>
+              </a:spcAft>
+              <a:buNone/>
+            </a:pPr>
+            <a:r>
+              <a:rPr lang="en-US" dirty="0"/>
+              <a:t>Show their results</a:t>
+            </a:r>
+            <a:endParaRPr dirty="0"/>
+          </a:p>
+        </p:txBody>
+      </p:sp>
+      <p:pic>
+        <p:nvPicPr>
+          <p:cNvPr id="3" name="Picture 2">
+            <a:extLst>
+              <a:ext uri="{FF2B5EF4-FFF2-40B4-BE49-F238E27FC236}">
+                <a16:creationId xmlns:a16="http://schemas.microsoft.com/office/drawing/2014/main" id="{8EAD2BE4-0545-4326-8E90-7DF4F069DD82}"/>
+              </a:ext>
+            </a:extLst>
+          </p:cNvPr>
+          <p:cNvPicPr>
+            <a:picLocks noChangeAspect="1"/>
+          </p:cNvPicPr>
+          <p:nvPr/>
+        </p:nvPicPr>
+        <p:blipFill>
+          <a:blip r:embed="rId3"/>
+          <a:stretch>
+            <a:fillRect/>
+          </a:stretch>
+        </p:blipFill>
+        <p:spPr>
+          <a:xfrm>
+            <a:off x="3505575" y="1152475"/>
+            <a:ext cx="5202038" cy="3416400"/>
+          </a:xfrm>
+          <a:prstGeom prst="rect">
+            <a:avLst/>
+          </a:prstGeom>
+        </p:spPr>
+      </p:pic>
+      <p:sp>
+        <p:nvSpPr>
+          <p:cNvPr id="4" name="TextBox 3">
+            <a:extLst>
+              <a:ext uri="{FF2B5EF4-FFF2-40B4-BE49-F238E27FC236}">
+                <a16:creationId xmlns:a16="http://schemas.microsoft.com/office/drawing/2014/main" id="{5BDDEB34-EEDC-4336-9A41-E9D88797D8B1}"/>
+              </a:ext>
+            </a:extLst>
+          </p:cNvPr>
+          <p:cNvSpPr txBox="1"/>
+          <p:nvPr/>
+        </p:nvSpPr>
+        <p:spPr>
+          <a:xfrm>
+            <a:off x="3069188" y="4810780"/>
+            <a:ext cx="6074812" cy="261610"/>
+          </a:xfrm>
+          <a:prstGeom prst="rect">
+            <a:avLst/>
+          </a:prstGeom>
+          <a:noFill/>
+        </p:spPr>
+        <p:txBody>
+          <a:bodyPr wrap="square" rtlCol="0">
+            <a:spAutoFit/>
+          </a:bodyPr>
+          <a:lstStyle/>
+          <a:p>
+            <a:r>
+              <a:rPr lang="en-US" sz="1050" dirty="0"/>
+              <a:t>Mott et. al. Towards Interpretable Reinforcement Learning Using Attention Augmented Agents</a:t>
+            </a:r>
           </a:p>
         </p:txBody>
       </p:sp>
@@ -8898,51 +9102,107 @@
               <a:buNone/>
             </a:pPr>
             <a:r>
-              <a:rPr lang="en"/>
-              <a:t>Model 4: Resnet-Attention</a:t>
+              <a:rPr lang="en" dirty="0"/>
+              <a:t>Model 4-1: Resnet-Attention (Chen and Yilong)</a:t>
             </a:r>
-            <a:endParaRPr/>
+            <a:endParaRPr dirty="0"/>
           </a:p>
         </p:txBody>
       </p:sp>
-      <p:sp>
-        <p:nvSpPr>
-          <p:cNvPr id="145" name="Google Shape;145;p28"/>
-          <p:cNvSpPr txBox="1">
-            <a:spLocks noGrp="1"/>
-          </p:cNvSpPr>
-          <p:nvPr>
-            <p:ph type="body" idx="1"/>
-          </p:nvPr>
-        </p:nvSpPr>
-        <p:spPr>
+      <p:pic>
+        <p:nvPicPr>
+          <p:cNvPr id="1028" name="Picture 4">
+            <a:extLst>
+              <a:ext uri="{FF2B5EF4-FFF2-40B4-BE49-F238E27FC236}">
+                <a16:creationId xmlns:a16="http://schemas.microsoft.com/office/drawing/2014/main" id="{B34B2BA4-F028-4B15-9ACC-C17D6FB6AC72}"/>
+              </a:ext>
+            </a:extLst>
+          </p:cNvPr>
+          <p:cNvPicPr>
+            <a:picLocks noChangeAspect="1" noChangeArrowheads="1"/>
+          </p:cNvPicPr>
+          <p:nvPr/>
+        </p:nvPicPr>
+        <p:blipFill>
+          <a:blip r:embed="rId3">
+            <a:extLst>
+              <a:ext uri="{28A0092B-C50C-407E-A947-70E740481C1C}">
+                <a14:useLocalDpi xmlns:a14="http://schemas.microsoft.com/office/drawing/2010/main" val="0"/>
+              </a:ext>
+            </a:extLst>
+          </a:blip>
+          <a:srcRect/>
+          <a:stretch>
+            <a:fillRect/>
+          </a:stretch>
+        </p:blipFill>
+        <p:spPr bwMode="auto">
           <a:xfrm>
-            <a:off x="311700" y="1152475"/>
-            <a:ext cx="8520600" cy="3416400"/>
+            <a:off x="311700" y="1017725"/>
+            <a:ext cx="4260545" cy="2901813"/>
           </a:xfrm>
           <a:prstGeom prst="rect">
             <a:avLst/>
           </a:prstGeom>
+          <a:noFill/>
+          <a:extLst>
+            <a:ext uri="{909E8E84-426E-40DD-AFC4-6F175D3DCCD1}">
+              <a14:hiddenFill xmlns:a14="http://schemas.microsoft.com/office/drawing/2010/main">
+                <a:solidFill>
+                  <a:srgbClr val="FFFFFF"/>
+                </a:solidFill>
+              </a14:hiddenFill>
+            </a:ext>
+          </a:extLst>
         </p:spPr>
-        <p:txBody>
-          <a:bodyPr spcFirstLastPara="1" wrap="square" lIns="91425" tIns="91425" rIns="91425" bIns="91425" anchor="t" anchorCtr="0">
-            <a:normAutofit/>
-          </a:bodyPr>
-          <a:lstStyle/>
-          <a:p>
-            <a:pPr marL="0" lvl="0" indent="0" algn="l" rtl="0">
-              <a:spcBef>
-                <a:spcPts val="0"/>
-              </a:spcBef>
-              <a:spcAft>
-                <a:spcPts val="1200"/>
-              </a:spcAft>
-              <a:buNone/>
-            </a:pPr>
-            <a:endParaRPr/>
-          </a:p>
-        </p:txBody>
-      </p:sp>
+      </p:pic>
+      <p:pic>
+        <p:nvPicPr>
+          <p:cNvPr id="1030" name="Picture 6">
+            <a:extLst>
+              <a:ext uri="{FF2B5EF4-FFF2-40B4-BE49-F238E27FC236}">
+                <a16:creationId xmlns:a16="http://schemas.microsoft.com/office/drawing/2014/main" id="{D8BCB70F-9452-4E36-B619-A7630DE30487}"/>
+              </a:ext>
+            </a:extLst>
+          </p:cNvPr>
+          <p:cNvPicPr>
+            <a:picLocks noChangeAspect="1" noChangeArrowheads="1"/>
+          </p:cNvPicPr>
+          <p:nvPr/>
+        </p:nvPicPr>
+        <p:blipFill>
+          <a:blip r:embed="rId4">
+            <a:extLst>
+              <a:ext uri="{28A0092B-C50C-407E-A947-70E740481C1C}">
+                <a14:useLocalDpi xmlns:a14="http://schemas.microsoft.com/office/drawing/2010/main" val="0"/>
+              </a:ext>
+            </a:extLst>
+          </a:blip>
+          <a:srcRect/>
+          <a:stretch>
+            <a:fillRect/>
+          </a:stretch>
+        </p:blipFill>
+        <p:spPr bwMode="auto">
+          <a:xfrm>
+            <a:off x="4568370" y="1223962"/>
+            <a:ext cx="4575630" cy="2309813"/>
+          </a:xfrm>
+          <a:prstGeom prst="rect">
+            <a:avLst/>
+          </a:prstGeom>
+          <a:noFill/>
+          <a:extLst>
+            <a:ext uri="{909E8E84-426E-40DD-AFC4-6F175D3DCCD1}">
+              <a14:hiddenFill xmlns:a14="http://schemas.microsoft.com/office/drawing/2010/main">
+                <a:solidFill>
+                  <a:srgbClr val="FFFFFF"/>
+                </a:solidFill>
+              </a14:hiddenFill>
+            </a:ext>
+          </a:extLst>
+        </p:spPr>
+      </p:pic>
     </p:spTree>
   </p:cSld>
   <p:clrMapOvr>
@@ -8952,6 +9212,161 @@
 </file>
 
 <file path=ppt/slides/slide17.xml><?xml version="1.0" encoding="utf-8"?>
+<p:sld xmlns:a="http://schemas.openxmlformats.org/drawingml/2006/main" xmlns:r="http://schemas.openxmlformats.org/officeDocument/2006/relationships" xmlns:p="http://schemas.openxmlformats.org/presentationml/2006/main">
+  <p:cSld>
+    <p:spTree>
+      <p:nvGrpSpPr>
+        <p:cNvPr id="1" name=""/>
+        <p:cNvGrpSpPr/>
+        <p:nvPr/>
+      </p:nvGrpSpPr>
+      <p:grpSpPr>
+        <a:xfrm>
+          <a:off x="0" y="0"/>
+          <a:ext cx="0" cy="0"/>
+          <a:chOff x="0" y="0"/>
+          <a:chExt cx="0" cy="0"/>
+        </a:xfrm>
+      </p:grpSpPr>
+      <p:sp>
+        <p:nvSpPr>
+          <p:cNvPr id="2" name="Title 1">
+            <a:extLst>
+              <a:ext uri="{FF2B5EF4-FFF2-40B4-BE49-F238E27FC236}">
+                <a16:creationId xmlns:a16="http://schemas.microsoft.com/office/drawing/2014/main" id="{22A0BB43-92AF-4BD9-8333-097E30F52734}"/>
+              </a:ext>
+            </a:extLst>
+          </p:cNvPr>
+          <p:cNvSpPr>
+            <a:spLocks noGrp="1"/>
+          </p:cNvSpPr>
+          <p:nvPr>
+            <p:ph type="title"/>
+          </p:nvPr>
+        </p:nvSpPr>
+        <p:spPr/>
+        <p:txBody>
+          <a:bodyPr>
+            <a:normAutofit fontScale="90000"/>
+          </a:bodyPr>
+          <a:lstStyle/>
+          <a:p>
+            <a:r>
+              <a:rPr lang="en" dirty="0"/>
+              <a:t>Model 4-2: Resnet-Attention (Chen Zhang and Yilong)</a:t>
+            </a:r>
+            <a:endParaRPr lang="en-US" dirty="0"/>
+          </a:p>
+        </p:txBody>
+      </p:sp>
+      <p:pic>
+        <p:nvPicPr>
+          <p:cNvPr id="3074" name="Picture 2">
+            <a:extLst>
+              <a:ext uri="{FF2B5EF4-FFF2-40B4-BE49-F238E27FC236}">
+                <a16:creationId xmlns:a16="http://schemas.microsoft.com/office/drawing/2014/main" id="{F0F25CBF-7C34-4CD4-9D52-1E4D9D60483A}"/>
+              </a:ext>
+            </a:extLst>
+          </p:cNvPr>
+          <p:cNvPicPr>
+            <a:picLocks noChangeAspect="1" noChangeArrowheads="1"/>
+          </p:cNvPicPr>
+          <p:nvPr/>
+        </p:nvPicPr>
+        <p:blipFill>
+          <a:blip r:embed="rId2">
+            <a:extLst>
+              <a:ext uri="{28A0092B-C50C-407E-A947-70E740481C1C}">
+                <a14:useLocalDpi xmlns:a14="http://schemas.microsoft.com/office/drawing/2010/main" val="0"/>
+              </a:ext>
+            </a:extLst>
+          </a:blip>
+          <a:srcRect/>
+          <a:stretch>
+            <a:fillRect/>
+          </a:stretch>
+        </p:blipFill>
+        <p:spPr bwMode="auto">
+          <a:xfrm>
+            <a:off x="4574710" y="1017725"/>
+            <a:ext cx="4569290" cy="2497000"/>
+          </a:xfrm>
+          <a:prstGeom prst="rect">
+            <a:avLst/>
+          </a:prstGeom>
+          <a:noFill/>
+          <a:extLst>
+            <a:ext uri="{909E8E84-426E-40DD-AFC4-6F175D3DCCD1}">
+              <a14:hiddenFill xmlns:a14="http://schemas.microsoft.com/office/drawing/2010/main">
+                <a:solidFill>
+                  <a:srgbClr val="FFFFFF"/>
+                </a:solidFill>
+              </a14:hiddenFill>
+            </a:ext>
+          </a:extLst>
+        </p:spPr>
+      </p:pic>
+      <p:pic>
+        <p:nvPicPr>
+          <p:cNvPr id="5" name="Picture 4">
+            <a:extLst>
+              <a:ext uri="{FF2B5EF4-FFF2-40B4-BE49-F238E27FC236}">
+                <a16:creationId xmlns:a16="http://schemas.microsoft.com/office/drawing/2014/main" id="{82ACF1D2-4EE7-4A27-B7F9-7E9A5AEDD8DC}"/>
+              </a:ext>
+            </a:extLst>
+          </p:cNvPr>
+          <p:cNvPicPr>
+            <a:picLocks noChangeAspect="1" noChangeArrowheads="1"/>
+          </p:cNvPicPr>
+          <p:nvPr/>
+        </p:nvPicPr>
+        <p:blipFill>
+          <a:blip r:embed="rId3">
+            <a:extLst>
+              <a:ext uri="{28A0092B-C50C-407E-A947-70E740481C1C}">
+                <a14:useLocalDpi xmlns:a14="http://schemas.microsoft.com/office/drawing/2010/main" val="0"/>
+              </a:ext>
+            </a:extLst>
+          </a:blip>
+          <a:srcRect/>
+          <a:stretch>
+            <a:fillRect/>
+          </a:stretch>
+        </p:blipFill>
+        <p:spPr bwMode="auto">
+          <a:xfrm>
+            <a:off x="311700" y="979625"/>
+            <a:ext cx="4260545" cy="2901813"/>
+          </a:xfrm>
+          <a:prstGeom prst="rect">
+            <a:avLst/>
+          </a:prstGeom>
+          <a:noFill/>
+          <a:extLst>
+            <a:ext uri="{909E8E84-426E-40DD-AFC4-6F175D3DCCD1}">
+              <a14:hiddenFill xmlns:a14="http://schemas.microsoft.com/office/drawing/2010/main">
+                <a:solidFill>
+                  <a:srgbClr val="FFFFFF"/>
+                </a:solidFill>
+              </a14:hiddenFill>
+            </a:ext>
+          </a:extLst>
+        </p:spPr>
+      </p:pic>
+    </p:spTree>
+    <p:extLst>
+      <p:ext uri="{BB962C8B-B14F-4D97-AF65-F5344CB8AC3E}">
+        <p14:creationId xmlns:p14="http://schemas.microsoft.com/office/powerpoint/2010/main" val="337281722"/>
+      </p:ext>
+    </p:extLst>
+  </p:cSld>
+  <p:clrMapOvr>
+    <a:masterClrMapping/>
+  </p:clrMapOvr>
+</p:sld>
+</file>
+
+<file path=ppt/slides/slide18.xml><?xml version="1.0" encoding="utf-8"?>
 <p:sld xmlns:a="http://schemas.openxmlformats.org/drawingml/2006/main" xmlns:r="http://schemas.openxmlformats.org/officeDocument/2006/relationships" xmlns:p="http://schemas.openxmlformats.org/presentationml/2006/main">
   <p:cSld>
     <p:spTree>
@@ -9010,44 +9425,474 @@
           </a:p>
         </p:txBody>
       </p:sp>
-      <p:sp>
-        <p:nvSpPr>
-          <p:cNvPr id="151" name="Google Shape;151;p29"/>
-          <p:cNvSpPr txBox="1">
-            <a:spLocks noGrp="1"/>
-          </p:cNvSpPr>
+      <p:graphicFrame>
+        <p:nvGraphicFramePr>
+          <p:cNvPr id="6" name="Google Shape;121;p24">
+            <a:extLst>
+              <a:ext uri="{FF2B5EF4-FFF2-40B4-BE49-F238E27FC236}">
+                <a16:creationId xmlns:a16="http://schemas.microsoft.com/office/drawing/2014/main" id="{D710341F-3A58-4E5A-AA0D-5D23390EE13B}"/>
+              </a:ext>
+            </a:extLst>
+          </p:cNvPr>
+          <p:cNvGraphicFramePr/>
           <p:nvPr>
-            <p:ph type="body" idx="1"/>
+            <p:extLst>
+              <p:ext uri="{D42A27DB-BD31-4B8C-83A1-F6EECF244321}">
+                <p14:modId xmlns:p14="http://schemas.microsoft.com/office/powerpoint/2010/main" val="3490978694"/>
+              </p:ext>
+            </p:extLst>
           </p:nvPr>
-        </p:nvSpPr>
+        </p:nvGraphicFramePr>
+        <p:xfrm>
+          <a:off x="311700" y="1017724"/>
+          <a:ext cx="8520599" cy="3862284"/>
+        </p:xfrm>
+        <a:graphic>
+          <a:graphicData uri="http://schemas.openxmlformats.org/drawingml/2006/table">
+            <a:tbl>
+              <a:tblPr>
+                <a:noFill/>
+                <a:tableStyleId>{7BA8023F-4284-441A-BF16-6069425AF09B}</a:tableStyleId>
+              </a:tblPr>
+              <a:tblGrid>
+                <a:gridCol w="1274213">
+                  <a:extLst>
+                    <a:ext uri="{9D8B030D-6E8A-4147-A177-3AD203B41FA5}">
+                      <a16:colId xmlns:a16="http://schemas.microsoft.com/office/drawing/2014/main" val="20000"/>
+                    </a:ext>
+                  </a:extLst>
+                </a:gridCol>
+                <a:gridCol w="1438275">
+                  <a:extLst>
+                    <a:ext uri="{9D8B030D-6E8A-4147-A177-3AD203B41FA5}">
+                      <a16:colId xmlns:a16="http://schemas.microsoft.com/office/drawing/2014/main" val="20001"/>
+                    </a:ext>
+                  </a:extLst>
+                </a:gridCol>
+                <a:gridCol w="1504950">
+                  <a:extLst>
+                    <a:ext uri="{9D8B030D-6E8A-4147-A177-3AD203B41FA5}">
+                      <a16:colId xmlns:a16="http://schemas.microsoft.com/office/drawing/2014/main" val="20002"/>
+                    </a:ext>
+                  </a:extLst>
+                </a:gridCol>
+                <a:gridCol w="2276475">
+                  <a:extLst>
+                    <a:ext uri="{9D8B030D-6E8A-4147-A177-3AD203B41FA5}">
+                      <a16:colId xmlns:a16="http://schemas.microsoft.com/office/drawing/2014/main" val="20003"/>
+                    </a:ext>
+                  </a:extLst>
+                </a:gridCol>
+                <a:gridCol w="2026686">
+                  <a:extLst>
+                    <a:ext uri="{9D8B030D-6E8A-4147-A177-3AD203B41FA5}">
+                      <a16:colId xmlns:a16="http://schemas.microsoft.com/office/drawing/2014/main" val="701499610"/>
+                    </a:ext>
+                  </a:extLst>
+                </a:gridCol>
+              </a:tblGrid>
+              <a:tr h="791291">
+                <a:tc>
+                  <a:txBody>
+                    <a:bodyPr/>
+                    <a:lstStyle/>
+                    <a:p>
+                      <a:pPr marL="0" lvl="0" indent="0" algn="l" rtl="0">
+                        <a:spcBef>
+                          <a:spcPts val="0"/>
+                        </a:spcBef>
+                        <a:spcAft>
+                          <a:spcPts val="0"/>
+                        </a:spcAft>
+                        <a:buNone/>
+                      </a:pPr>
+                      <a:r>
+                        <a:rPr lang="en-US" dirty="0"/>
+                        <a:t>Baseline</a:t>
+                      </a:r>
+                    </a:p>
+                  </a:txBody>
+                  <a:tcPr marL="91425" marR="91425" marT="91425" marB="91425"/>
+                </a:tc>
+                <a:tc>
+                  <a:txBody>
+                    <a:bodyPr/>
+                    <a:lstStyle/>
+                    <a:p>
+                      <a:pPr marL="0" lvl="0" indent="0" algn="l" rtl="0">
+                        <a:spcBef>
+                          <a:spcPts val="0"/>
+                        </a:spcBef>
+                        <a:spcAft>
+                          <a:spcPts val="0"/>
+                        </a:spcAft>
+                        <a:buNone/>
+                      </a:pPr>
+                      <a:r>
+                        <a:rPr lang="en-US" dirty="0"/>
+                        <a:t>Resnet-50</a:t>
+                      </a:r>
+                    </a:p>
+                  </a:txBody>
+                  <a:tcPr marL="91425" marR="91425" marT="91425" marB="91425"/>
+                </a:tc>
+                <a:tc>
+                  <a:txBody>
+                    <a:bodyPr/>
+                    <a:lstStyle/>
+                    <a:p>
+                      <a:pPr marL="0" lvl="0" indent="0" algn="l" rtl="0">
+                        <a:spcBef>
+                          <a:spcPts val="0"/>
+                        </a:spcBef>
+                        <a:spcAft>
+                          <a:spcPts val="0"/>
+                        </a:spcAft>
+                        <a:buNone/>
+                      </a:pPr>
+                      <a:r>
+                        <a:rPr lang="en-US" dirty="0"/>
+                        <a:t>Attention</a:t>
+                      </a:r>
+                    </a:p>
+                  </a:txBody>
+                  <a:tcPr marL="91425" marR="91425" marT="91425" marB="91425"/>
+                </a:tc>
+                <a:tc>
+                  <a:txBody>
+                    <a:bodyPr/>
+                    <a:lstStyle/>
+                    <a:p>
+                      <a:pPr marL="0" lvl="0" indent="0" algn="l" rtl="0">
+                        <a:spcBef>
+                          <a:spcPts val="0"/>
+                        </a:spcBef>
+                        <a:spcAft>
+                          <a:spcPts val="0"/>
+                        </a:spcAft>
+                        <a:buNone/>
+                      </a:pPr>
+                      <a:r>
+                        <a:rPr lang="en-US" dirty="0"/>
+                        <a:t>Res-Attention-1</a:t>
+                      </a:r>
+                    </a:p>
+                  </a:txBody>
+                  <a:tcPr marL="91425" marR="91425" marT="91425" marB="91425"/>
+                </a:tc>
+                <a:tc>
+                  <a:txBody>
+                    <a:bodyPr/>
+                    <a:lstStyle/>
+                    <a:p>
+                      <a:pPr marL="0" lvl="0" indent="0" algn="l" rtl="0">
+                        <a:spcBef>
+                          <a:spcPts val="0"/>
+                        </a:spcBef>
+                        <a:spcAft>
+                          <a:spcPts val="0"/>
+                        </a:spcAft>
+                        <a:buNone/>
+                      </a:pPr>
+                      <a:r>
+                        <a:rPr lang="en-US" dirty="0"/>
+                        <a:t>Res-Attention-2</a:t>
+                      </a:r>
+                    </a:p>
+                  </a:txBody>
+                  <a:tcPr marL="91425" marR="91425" marT="91425" marB="91425"/>
+                </a:tc>
+                <a:extLst>
+                  <a:ext uri="{0D108BD9-81ED-4DB2-BD59-A6C34878D82A}">
+                    <a16:rowId xmlns:a16="http://schemas.microsoft.com/office/drawing/2014/main" val="10000"/>
+                  </a:ext>
+                </a:extLst>
+              </a:tr>
+              <a:tr h="1527129">
+                <a:tc>
+                  <a:txBody>
+                    <a:bodyPr/>
+                    <a:lstStyle/>
+                    <a:p>
+                      <a:pPr marL="0" lvl="0" indent="0" algn="l" rtl="0">
+                        <a:spcBef>
+                          <a:spcPts val="0"/>
+                        </a:spcBef>
+                        <a:spcAft>
+                          <a:spcPts val="0"/>
+                        </a:spcAft>
+                        <a:buNone/>
+                      </a:pPr>
+                      <a:endParaRPr dirty="0"/>
+                    </a:p>
+                  </a:txBody>
+                  <a:tcPr marL="91425" marR="91425" marT="91425" marB="91425"/>
+                </a:tc>
+                <a:tc>
+                  <a:txBody>
+                    <a:bodyPr/>
+                    <a:lstStyle/>
+                    <a:p>
+                      <a:pPr marL="0" lvl="0" indent="0" algn="l" rtl="0">
+                        <a:spcBef>
+                          <a:spcPts val="0"/>
+                        </a:spcBef>
+                        <a:spcAft>
+                          <a:spcPts val="0"/>
+                        </a:spcAft>
+                        <a:buNone/>
+                      </a:pPr>
+                      <a:endParaRPr dirty="0"/>
+                    </a:p>
+                  </a:txBody>
+                  <a:tcPr marL="91425" marR="91425" marT="91425" marB="91425"/>
+                </a:tc>
+                <a:tc>
+                  <a:txBody>
+                    <a:bodyPr/>
+                    <a:lstStyle/>
+                    <a:p>
+                      <a:pPr marL="0" lvl="0" indent="0" algn="l" rtl="0">
+                        <a:spcBef>
+                          <a:spcPts val="0"/>
+                        </a:spcBef>
+                        <a:spcAft>
+                          <a:spcPts val="0"/>
+                        </a:spcAft>
+                        <a:buNone/>
+                      </a:pPr>
+                      <a:endParaRPr/>
+                    </a:p>
+                  </a:txBody>
+                  <a:tcPr marL="91425" marR="91425" marT="91425" marB="91425"/>
+                </a:tc>
+                <a:tc>
+                  <a:txBody>
+                    <a:bodyPr/>
+                    <a:lstStyle/>
+                    <a:p>
+                      <a:pPr marL="0" lvl="0" indent="0" algn="l" rtl="0">
+                        <a:spcBef>
+                          <a:spcPts val="0"/>
+                        </a:spcBef>
+                        <a:spcAft>
+                          <a:spcPts val="0"/>
+                        </a:spcAft>
+                        <a:buNone/>
+                      </a:pPr>
+                      <a:endParaRPr dirty="0"/>
+                    </a:p>
+                  </a:txBody>
+                  <a:tcPr marL="91425" marR="91425" marT="91425" marB="91425"/>
+                </a:tc>
+                <a:tc>
+                  <a:txBody>
+                    <a:bodyPr/>
+                    <a:lstStyle/>
+                    <a:p>
+                      <a:pPr marL="0" lvl="0" indent="0" algn="l" rtl="0">
+                        <a:spcBef>
+                          <a:spcPts val="0"/>
+                        </a:spcBef>
+                        <a:spcAft>
+                          <a:spcPts val="0"/>
+                        </a:spcAft>
+                        <a:buNone/>
+                      </a:pPr>
+                      <a:endParaRPr/>
+                    </a:p>
+                  </a:txBody>
+                  <a:tcPr marL="91425" marR="91425" marT="91425" marB="91425"/>
+                </a:tc>
+                <a:extLst>
+                  <a:ext uri="{0D108BD9-81ED-4DB2-BD59-A6C34878D82A}">
+                    <a16:rowId xmlns:a16="http://schemas.microsoft.com/office/drawing/2014/main" val="10001"/>
+                  </a:ext>
+                </a:extLst>
+              </a:tr>
+              <a:tr h="1543864">
+                <a:tc>
+                  <a:txBody>
+                    <a:bodyPr/>
+                    <a:lstStyle/>
+                    <a:p>
+                      <a:pPr marL="0" lvl="0" indent="0" algn="l" rtl="0">
+                        <a:spcBef>
+                          <a:spcPts val="0"/>
+                        </a:spcBef>
+                        <a:spcAft>
+                          <a:spcPts val="0"/>
+                        </a:spcAft>
+                        <a:buNone/>
+                      </a:pPr>
+                      <a:endParaRPr dirty="0"/>
+                    </a:p>
+                  </a:txBody>
+                  <a:tcPr marL="91425" marR="91425" marT="91425" marB="91425"/>
+                </a:tc>
+                <a:tc>
+                  <a:txBody>
+                    <a:bodyPr/>
+                    <a:lstStyle/>
+                    <a:p>
+                      <a:pPr marL="0" lvl="0" indent="0" algn="l" rtl="0">
+                        <a:spcBef>
+                          <a:spcPts val="0"/>
+                        </a:spcBef>
+                        <a:spcAft>
+                          <a:spcPts val="0"/>
+                        </a:spcAft>
+                        <a:buNone/>
+                      </a:pPr>
+                      <a:endParaRPr dirty="0"/>
+                    </a:p>
+                  </a:txBody>
+                  <a:tcPr marL="91425" marR="91425" marT="91425" marB="91425"/>
+                </a:tc>
+                <a:tc>
+                  <a:txBody>
+                    <a:bodyPr/>
+                    <a:lstStyle/>
+                    <a:p>
+                      <a:pPr marL="0" lvl="0" indent="0" algn="l" rtl="0">
+                        <a:spcBef>
+                          <a:spcPts val="0"/>
+                        </a:spcBef>
+                        <a:spcAft>
+                          <a:spcPts val="0"/>
+                        </a:spcAft>
+                        <a:buNone/>
+                      </a:pPr>
+                      <a:endParaRPr/>
+                    </a:p>
+                  </a:txBody>
+                  <a:tcPr marL="91425" marR="91425" marT="91425" marB="91425"/>
+                </a:tc>
+                <a:tc>
+                  <a:txBody>
+                    <a:bodyPr/>
+                    <a:lstStyle/>
+                    <a:p>
+                      <a:pPr marL="0" lvl="0" indent="0" algn="l" rtl="0">
+                        <a:spcBef>
+                          <a:spcPts val="0"/>
+                        </a:spcBef>
+                        <a:spcAft>
+                          <a:spcPts val="0"/>
+                        </a:spcAft>
+                        <a:buNone/>
+                      </a:pPr>
+                      <a:endParaRPr dirty="0"/>
+                    </a:p>
+                  </a:txBody>
+                  <a:tcPr marL="91425" marR="91425" marT="91425" marB="91425"/>
+                </a:tc>
+                <a:tc>
+                  <a:txBody>
+                    <a:bodyPr/>
+                    <a:lstStyle/>
+                    <a:p>
+                      <a:pPr marL="0" lvl="0" indent="0" algn="l" rtl="0">
+                        <a:spcBef>
+                          <a:spcPts val="0"/>
+                        </a:spcBef>
+                        <a:spcAft>
+                          <a:spcPts val="0"/>
+                        </a:spcAft>
+                        <a:buNone/>
+                      </a:pPr>
+                      <a:endParaRPr dirty="0"/>
+                    </a:p>
+                  </a:txBody>
+                  <a:tcPr marL="91425" marR="91425" marT="91425" marB="91425"/>
+                </a:tc>
+                <a:extLst>
+                  <a:ext uri="{0D108BD9-81ED-4DB2-BD59-A6C34878D82A}">
+                    <a16:rowId xmlns:a16="http://schemas.microsoft.com/office/drawing/2014/main" val="10002"/>
+                  </a:ext>
+                </a:extLst>
+              </a:tr>
+            </a:tbl>
+          </a:graphicData>
+        </a:graphic>
+      </p:graphicFrame>
+      <p:pic>
+        <p:nvPicPr>
+          <p:cNvPr id="7" name="Picture 4">
+            <a:extLst>
+              <a:ext uri="{FF2B5EF4-FFF2-40B4-BE49-F238E27FC236}">
+                <a16:creationId xmlns:a16="http://schemas.microsoft.com/office/drawing/2014/main" id="{95010318-5A16-4288-92C9-3E12AFC06DF5}"/>
+              </a:ext>
+            </a:extLst>
+          </p:cNvPr>
+          <p:cNvPicPr>
+            <a:picLocks noChangeAspect="1" noChangeArrowheads="1"/>
+          </p:cNvPicPr>
+          <p:nvPr/>
+        </p:nvPicPr>
+        <p:blipFill>
+          <a:blip r:embed="rId3">
+            <a:extLst>
+              <a:ext uri="{28A0092B-C50C-407E-A947-70E740481C1C}">
+                <a14:useLocalDpi xmlns:a14="http://schemas.microsoft.com/office/drawing/2010/main" val="0"/>
+              </a:ext>
+            </a:extLst>
+          </a:blip>
+          <a:srcRect/>
+          <a:stretch>
+            <a:fillRect/>
+          </a:stretch>
+        </p:blipFill>
+        <p:spPr bwMode="auto">
+          <a:xfrm>
+            <a:off x="4571999" y="1828499"/>
+            <a:ext cx="2182536" cy="1486502"/>
+          </a:xfrm>
+          <a:prstGeom prst="rect">
+            <a:avLst/>
+          </a:prstGeom>
+          <a:noFill/>
+          <a:extLst>
+            <a:ext uri="{909E8E84-426E-40DD-AFC4-6F175D3DCCD1}">
+              <a14:hiddenFill xmlns:a14="http://schemas.microsoft.com/office/drawing/2010/main">
+                <a:solidFill>
+                  <a:srgbClr val="FFFFFF"/>
+                </a:solidFill>
+              </a14:hiddenFill>
+            </a:ext>
+          </a:extLst>
+        </p:spPr>
+      </p:pic>
+      <p:pic>
+        <p:nvPicPr>
+          <p:cNvPr id="5" name="Picture 4">
+            <a:extLst>
+              <a:ext uri="{FF2B5EF4-FFF2-40B4-BE49-F238E27FC236}">
+                <a16:creationId xmlns:a16="http://schemas.microsoft.com/office/drawing/2014/main" id="{CC3AFF25-C207-445D-B7E6-886E4CF1A7A0}"/>
+              </a:ext>
+            </a:extLst>
+          </p:cNvPr>
+          <p:cNvPicPr>
+            <a:picLocks noChangeAspect="1"/>
+          </p:cNvPicPr>
+          <p:nvPr/>
+        </p:nvPicPr>
+        <p:blipFill>
+          <a:blip r:embed="rId4"/>
+          <a:stretch>
+            <a:fillRect/>
+          </a:stretch>
+        </p:blipFill>
         <p:spPr>
           <a:xfrm>
-            <a:off x="311700" y="1152475"/>
-            <a:ext cx="8520600" cy="3416400"/>
+            <a:off x="4678260" y="3370846"/>
+            <a:ext cx="1972094" cy="1486503"/>
           </a:xfrm>
           <a:prstGeom prst="rect">
             <a:avLst/>
           </a:prstGeom>
         </p:spPr>
-        <p:txBody>
-          <a:bodyPr spcFirstLastPara="1" wrap="square" lIns="91425" tIns="91425" rIns="91425" bIns="91425" anchor="t" anchorCtr="0">
-            <a:normAutofit/>
-          </a:bodyPr>
-          <a:lstStyle/>
-          <a:p>
-            <a:pPr marL="0" lvl="0" indent="0" algn="l" rtl="0">
-              <a:spcBef>
-                <a:spcPts val="0"/>
-              </a:spcBef>
-              <a:spcAft>
-                <a:spcPts val="1200"/>
-              </a:spcAft>
-              <a:buNone/>
-            </a:pPr>
-            <a:endParaRPr/>
-          </a:p>
-        </p:txBody>
-      </p:sp>
+      </p:pic>
     </p:spTree>
   </p:cSld>
   <p:clrMapOvr>
@@ -9056,7 +9901,7 @@
 </p:sld>
 </file>
 
-<file path=ppt/slides/slide18.xml><?xml version="1.0" encoding="utf-8"?>
+<file path=ppt/slides/slide19.xml><?xml version="1.0" encoding="utf-8"?>
 <p:sld xmlns:a="http://schemas.openxmlformats.org/drawingml/2006/main" xmlns:r="http://schemas.openxmlformats.org/officeDocument/2006/relationships" xmlns:p="http://schemas.openxmlformats.org/presentationml/2006/main">
   <p:cSld>
     <p:spTree>
@@ -9115,149 +9960,559 @@
           </a:p>
         </p:txBody>
       </p:sp>
-      <p:sp>
-        <p:nvSpPr>
-          <p:cNvPr id="157" name="Google Shape;157;p30"/>
-          <p:cNvSpPr txBox="1">
-            <a:spLocks noGrp="1"/>
-          </p:cNvSpPr>
+      <p:graphicFrame>
+        <p:nvGraphicFramePr>
+          <p:cNvPr id="4" name="Google Shape;121;p24">
+            <a:extLst>
+              <a:ext uri="{FF2B5EF4-FFF2-40B4-BE49-F238E27FC236}">
+                <a16:creationId xmlns:a16="http://schemas.microsoft.com/office/drawing/2014/main" id="{AD4307BC-77AC-415E-A34D-8BEA43599EAB}"/>
+              </a:ext>
+            </a:extLst>
+          </p:cNvPr>
+          <p:cNvGraphicFramePr/>
           <p:nvPr>
-            <p:ph type="body" idx="1"/>
+            <p:extLst>
+              <p:ext uri="{D42A27DB-BD31-4B8C-83A1-F6EECF244321}">
+                <p14:modId xmlns:p14="http://schemas.microsoft.com/office/powerpoint/2010/main" val="1779220469"/>
+              </p:ext>
+            </p:extLst>
           </p:nvPr>
-        </p:nvSpPr>
+        </p:nvGraphicFramePr>
+        <p:xfrm>
+          <a:off x="311700" y="1017724"/>
+          <a:ext cx="8198888" cy="3862284"/>
+        </p:xfrm>
+        <a:graphic>
+          <a:graphicData uri="http://schemas.openxmlformats.org/drawingml/2006/table">
+            <a:tbl>
+              <a:tblPr>
+                <a:noFill/>
+                <a:tableStyleId>{7BA8023F-4284-441A-BF16-6069425AF09B}</a:tableStyleId>
+              </a:tblPr>
+              <a:tblGrid>
+                <a:gridCol w="1141401">
+                  <a:extLst>
+                    <a:ext uri="{9D8B030D-6E8A-4147-A177-3AD203B41FA5}">
+                      <a16:colId xmlns:a16="http://schemas.microsoft.com/office/drawing/2014/main" val="3801025213"/>
+                    </a:ext>
+                  </a:extLst>
+                </a:gridCol>
+                <a:gridCol w="1290099">
+                  <a:extLst>
+                    <a:ext uri="{9D8B030D-6E8A-4147-A177-3AD203B41FA5}">
+                      <a16:colId xmlns:a16="http://schemas.microsoft.com/office/drawing/2014/main" val="20000"/>
+                    </a:ext>
+                  </a:extLst>
+                </a:gridCol>
+                <a:gridCol w="1314450">
+                  <a:extLst>
+                    <a:ext uri="{9D8B030D-6E8A-4147-A177-3AD203B41FA5}">
+                      <a16:colId xmlns:a16="http://schemas.microsoft.com/office/drawing/2014/main" val="20001"/>
+                    </a:ext>
+                  </a:extLst>
+                </a:gridCol>
+                <a:gridCol w="1423988">
+                  <a:extLst>
+                    <a:ext uri="{9D8B030D-6E8A-4147-A177-3AD203B41FA5}">
+                      <a16:colId xmlns:a16="http://schemas.microsoft.com/office/drawing/2014/main" val="20002"/>
+                    </a:ext>
+                  </a:extLst>
+                </a:gridCol>
+                <a:gridCol w="1514475">
+                  <a:extLst>
+                    <a:ext uri="{9D8B030D-6E8A-4147-A177-3AD203B41FA5}">
+                      <a16:colId xmlns:a16="http://schemas.microsoft.com/office/drawing/2014/main" val="20003"/>
+                    </a:ext>
+                  </a:extLst>
+                </a:gridCol>
+                <a:gridCol w="1514475">
+                  <a:extLst>
+                    <a:ext uri="{9D8B030D-6E8A-4147-A177-3AD203B41FA5}">
+                      <a16:colId xmlns:a16="http://schemas.microsoft.com/office/drawing/2014/main" val="2587612687"/>
+                    </a:ext>
+                  </a:extLst>
+                </a:gridCol>
+              </a:tblGrid>
+              <a:tr h="791291">
+                <a:tc>
+                  <a:txBody>
+                    <a:bodyPr/>
+                    <a:lstStyle/>
+                    <a:p>
+                      <a:pPr marL="0" lvl="0" indent="0" algn="l" rtl="0">
+                        <a:spcBef>
+                          <a:spcPts val="0"/>
+                        </a:spcBef>
+                        <a:spcAft>
+                          <a:spcPts val="0"/>
+                        </a:spcAft>
+                        <a:buNone/>
+                      </a:pPr>
+                      <a:endParaRPr lang="en-US" dirty="0"/>
+                    </a:p>
+                  </a:txBody>
+                  <a:tcPr marL="91425" marR="91425" marT="91425" marB="91425"/>
+                </a:tc>
+                <a:tc>
+                  <a:txBody>
+                    <a:bodyPr/>
+                    <a:lstStyle/>
+                    <a:p>
+                      <a:pPr marL="0" lvl="0" indent="0" algn="l" rtl="0">
+                        <a:spcBef>
+                          <a:spcPts val="0"/>
+                        </a:spcBef>
+                        <a:spcAft>
+                          <a:spcPts val="0"/>
+                        </a:spcAft>
+                        <a:buNone/>
+                      </a:pPr>
+                      <a:r>
+                        <a:rPr lang="en-US" dirty="0"/>
+                        <a:t>Baseline</a:t>
+                      </a:r>
+                    </a:p>
+                  </a:txBody>
+                  <a:tcPr marL="91425" marR="91425" marT="91425" marB="91425"/>
+                </a:tc>
+                <a:tc>
+                  <a:txBody>
+                    <a:bodyPr/>
+                    <a:lstStyle/>
+                    <a:p>
+                      <a:pPr marL="0" lvl="0" indent="0" algn="l" rtl="0">
+                        <a:spcBef>
+                          <a:spcPts val="0"/>
+                        </a:spcBef>
+                        <a:spcAft>
+                          <a:spcPts val="0"/>
+                        </a:spcAft>
+                        <a:buNone/>
+                      </a:pPr>
+                      <a:r>
+                        <a:rPr lang="en-US" dirty="0"/>
+                        <a:t>Resnet-50</a:t>
+                      </a:r>
+                    </a:p>
+                  </a:txBody>
+                  <a:tcPr marL="91425" marR="91425" marT="91425" marB="91425"/>
+                </a:tc>
+                <a:tc>
+                  <a:txBody>
+                    <a:bodyPr/>
+                    <a:lstStyle/>
+                    <a:p>
+                      <a:pPr marL="0" lvl="0" indent="0" algn="l" rtl="0">
+                        <a:spcBef>
+                          <a:spcPts val="0"/>
+                        </a:spcBef>
+                        <a:spcAft>
+                          <a:spcPts val="0"/>
+                        </a:spcAft>
+                        <a:buNone/>
+                      </a:pPr>
+                      <a:r>
+                        <a:rPr lang="en-US" dirty="0"/>
+                        <a:t>Attention</a:t>
+                      </a:r>
+                    </a:p>
+                  </a:txBody>
+                  <a:tcPr marL="91425" marR="91425" marT="91425" marB="91425"/>
+                </a:tc>
+                <a:tc>
+                  <a:txBody>
+                    <a:bodyPr/>
+                    <a:lstStyle/>
+                    <a:p>
+                      <a:pPr marL="0" lvl="0" indent="0" algn="l" rtl="0">
+                        <a:spcBef>
+                          <a:spcPts val="0"/>
+                        </a:spcBef>
+                        <a:spcAft>
+                          <a:spcPts val="0"/>
+                        </a:spcAft>
+                        <a:buNone/>
+                      </a:pPr>
+                      <a:r>
+                        <a:rPr lang="en-US" dirty="0"/>
+                        <a:t>Res-Attention-1</a:t>
+                      </a:r>
+                    </a:p>
+                  </a:txBody>
+                  <a:tcPr marL="91425" marR="91425" marT="91425" marB="91425"/>
+                </a:tc>
+                <a:tc>
+                  <a:txBody>
+                    <a:bodyPr/>
+                    <a:lstStyle/>
+                    <a:p>
+                      <a:pPr marL="0" lvl="0" indent="0" algn="l" rtl="0">
+                        <a:spcBef>
+                          <a:spcPts val="0"/>
+                        </a:spcBef>
+                        <a:spcAft>
+                          <a:spcPts val="0"/>
+                        </a:spcAft>
+                        <a:buNone/>
+                      </a:pPr>
+                      <a:r>
+                        <a:rPr lang="en-US" dirty="0"/>
+                        <a:t>Res-Attention-2</a:t>
+                      </a:r>
+                    </a:p>
+                  </a:txBody>
+                  <a:tcPr marL="91425" marR="91425" marT="91425" marB="91425"/>
+                </a:tc>
+                <a:extLst>
+                  <a:ext uri="{0D108BD9-81ED-4DB2-BD59-A6C34878D82A}">
+                    <a16:rowId xmlns:a16="http://schemas.microsoft.com/office/drawing/2014/main" val="10000"/>
+                  </a:ext>
+                </a:extLst>
+              </a:tr>
+              <a:tr h="1527129">
+                <a:tc>
+                  <a:txBody>
+                    <a:bodyPr/>
+                    <a:lstStyle/>
+                    <a:p>
+                      <a:pPr marL="0" marR="0" lvl="0" indent="0" algn="l" defTabSz="914400" rtl="0" eaLnBrk="1" fontAlgn="auto" latinLnBrk="0" hangingPunct="1">
+                        <a:lnSpc>
+                          <a:spcPct val="100000"/>
+                        </a:lnSpc>
+                        <a:spcBef>
+                          <a:spcPts val="0"/>
+                        </a:spcBef>
+                        <a:spcAft>
+                          <a:spcPts val="0"/>
+                        </a:spcAft>
+                        <a:buClr>
+                          <a:srgbClr val="000000"/>
+                        </a:buClr>
+                        <a:buSzTx/>
+                        <a:buFont typeface="Arial"/>
+                        <a:buNone/>
+                        <a:tabLst/>
+                        <a:defRPr/>
+                      </a:pPr>
+                      <a:r>
+                        <a:rPr lang="en" dirty="0"/>
+                        <a:t>Observation</a:t>
+                      </a:r>
+                    </a:p>
+                  </a:txBody>
+                  <a:tcPr marL="91425" marR="91425" marT="91425" marB="91425"/>
+                </a:tc>
+                <a:tc>
+                  <a:txBody>
+                    <a:bodyPr/>
+                    <a:lstStyle/>
+                    <a:p>
+                      <a:pPr marL="0" lvl="0" indent="0" algn="l" rtl="0">
+                        <a:spcBef>
+                          <a:spcPts val="0"/>
+                        </a:spcBef>
+                        <a:spcAft>
+                          <a:spcPts val="0"/>
+                        </a:spcAft>
+                        <a:buNone/>
+                      </a:pPr>
+                      <a:endParaRPr dirty="0"/>
+                    </a:p>
+                  </a:txBody>
+                  <a:tcPr marL="91425" marR="91425" marT="91425" marB="91425"/>
+                </a:tc>
+                <a:tc>
+                  <a:txBody>
+                    <a:bodyPr/>
+                    <a:lstStyle/>
+                    <a:p>
+                      <a:pPr marL="0" lvl="0" indent="0" algn="l" rtl="0">
+                        <a:spcBef>
+                          <a:spcPts val="0"/>
+                        </a:spcBef>
+                        <a:spcAft>
+                          <a:spcPts val="0"/>
+                        </a:spcAft>
+                        <a:buNone/>
+                      </a:pPr>
+                      <a:endParaRPr dirty="0"/>
+                    </a:p>
+                  </a:txBody>
+                  <a:tcPr marL="91425" marR="91425" marT="91425" marB="91425"/>
+                </a:tc>
+                <a:tc>
+                  <a:txBody>
+                    <a:bodyPr/>
+                    <a:lstStyle/>
+                    <a:p>
+                      <a:pPr marL="0" lvl="0" indent="0" algn="l" rtl="0">
+                        <a:spcBef>
+                          <a:spcPts val="0"/>
+                        </a:spcBef>
+                        <a:spcAft>
+                          <a:spcPts val="0"/>
+                        </a:spcAft>
+                        <a:buNone/>
+                      </a:pPr>
+                      <a:endParaRPr dirty="0"/>
+                    </a:p>
+                  </a:txBody>
+                  <a:tcPr marL="91425" marR="91425" marT="91425" marB="91425"/>
+                </a:tc>
+                <a:tc>
+                  <a:txBody>
+                    <a:bodyPr/>
+                    <a:lstStyle/>
+                    <a:p>
+                      <a:pPr marL="0" lvl="0" indent="0" algn="l" rtl="0">
+                        <a:spcBef>
+                          <a:spcPts val="0"/>
+                        </a:spcBef>
+                        <a:spcAft>
+                          <a:spcPts val="0"/>
+                        </a:spcAft>
+                        <a:buNone/>
+                      </a:pPr>
+                      <a:endParaRPr dirty="0"/>
+                    </a:p>
+                  </a:txBody>
+                  <a:tcPr marL="91425" marR="91425" marT="91425" marB="91425"/>
+                </a:tc>
+                <a:tc>
+                  <a:txBody>
+                    <a:bodyPr/>
+                    <a:lstStyle/>
+                    <a:p>
+                      <a:pPr marL="0" lvl="0" indent="0" algn="l" rtl="0">
+                        <a:spcBef>
+                          <a:spcPts val="0"/>
+                        </a:spcBef>
+                        <a:spcAft>
+                          <a:spcPts val="0"/>
+                        </a:spcAft>
+                        <a:buNone/>
+                      </a:pPr>
+                      <a:endParaRPr dirty="0"/>
+                    </a:p>
+                  </a:txBody>
+                  <a:tcPr marL="91425" marR="91425" marT="91425" marB="91425"/>
+                </a:tc>
+                <a:extLst>
+                  <a:ext uri="{0D108BD9-81ED-4DB2-BD59-A6C34878D82A}">
+                    <a16:rowId xmlns:a16="http://schemas.microsoft.com/office/drawing/2014/main" val="10001"/>
+                  </a:ext>
+                </a:extLst>
+              </a:tr>
+              <a:tr h="1543864">
+                <a:tc>
+                  <a:txBody>
+                    <a:bodyPr/>
+                    <a:lstStyle/>
+                    <a:p>
+                      <a:pPr marL="0" marR="0" lvl="0" indent="0" algn="l" defTabSz="914400" rtl="0" eaLnBrk="1" fontAlgn="auto" latinLnBrk="0" hangingPunct="1">
+                        <a:lnSpc>
+                          <a:spcPct val="100000"/>
+                        </a:lnSpc>
+                        <a:spcBef>
+                          <a:spcPts val="0"/>
+                        </a:spcBef>
+                        <a:spcAft>
+                          <a:spcPts val="0"/>
+                        </a:spcAft>
+                        <a:buClr>
+                          <a:srgbClr val="000000"/>
+                        </a:buClr>
+                        <a:buSzTx/>
+                        <a:buFont typeface="Arial"/>
+                        <a:buNone/>
+                        <a:tabLst/>
+                        <a:defRPr/>
+                      </a:pPr>
+                      <a:r>
+                        <a:rPr lang="en-US" dirty="0"/>
+                        <a:t>Attention</a:t>
+                      </a:r>
+                    </a:p>
+                    <a:p>
+                      <a:pPr marL="0" lvl="0" indent="0" algn="l" rtl="0">
+                        <a:spcBef>
+                          <a:spcPts val="0"/>
+                        </a:spcBef>
+                        <a:spcAft>
+                          <a:spcPts val="0"/>
+                        </a:spcAft>
+                        <a:buNone/>
+                      </a:pPr>
+                      <a:endParaRPr dirty="0"/>
+                    </a:p>
+                  </a:txBody>
+                  <a:tcPr marL="91425" marR="91425" marT="91425" marB="91425"/>
+                </a:tc>
+                <a:tc>
+                  <a:txBody>
+                    <a:bodyPr/>
+                    <a:lstStyle/>
+                    <a:p>
+                      <a:pPr marL="0" lvl="0" indent="0" algn="l" rtl="0">
+                        <a:spcBef>
+                          <a:spcPts val="0"/>
+                        </a:spcBef>
+                        <a:spcAft>
+                          <a:spcPts val="0"/>
+                        </a:spcAft>
+                        <a:buNone/>
+                      </a:pPr>
+                      <a:endParaRPr dirty="0"/>
+                    </a:p>
+                  </a:txBody>
+                  <a:tcPr marL="91425" marR="91425" marT="91425" marB="91425"/>
+                </a:tc>
+                <a:tc>
+                  <a:txBody>
+                    <a:bodyPr/>
+                    <a:lstStyle/>
+                    <a:p>
+                      <a:pPr marL="0" lvl="0" indent="0" algn="l" rtl="0">
+                        <a:spcBef>
+                          <a:spcPts val="0"/>
+                        </a:spcBef>
+                        <a:spcAft>
+                          <a:spcPts val="0"/>
+                        </a:spcAft>
+                        <a:buNone/>
+                      </a:pPr>
+                      <a:endParaRPr dirty="0"/>
+                    </a:p>
+                  </a:txBody>
+                  <a:tcPr marL="91425" marR="91425" marT="91425" marB="91425"/>
+                </a:tc>
+                <a:tc>
+                  <a:txBody>
+                    <a:bodyPr/>
+                    <a:lstStyle/>
+                    <a:p>
+                      <a:pPr marL="0" lvl="0" indent="0" algn="l" rtl="0">
+                        <a:spcBef>
+                          <a:spcPts val="0"/>
+                        </a:spcBef>
+                        <a:spcAft>
+                          <a:spcPts val="0"/>
+                        </a:spcAft>
+                        <a:buNone/>
+                      </a:pPr>
+                      <a:endParaRPr dirty="0"/>
+                    </a:p>
+                  </a:txBody>
+                  <a:tcPr marL="91425" marR="91425" marT="91425" marB="91425"/>
+                </a:tc>
+                <a:tc>
+                  <a:txBody>
+                    <a:bodyPr/>
+                    <a:lstStyle/>
+                    <a:p>
+                      <a:pPr marL="0" lvl="0" indent="0" algn="l" rtl="0">
+                        <a:spcBef>
+                          <a:spcPts val="0"/>
+                        </a:spcBef>
+                        <a:spcAft>
+                          <a:spcPts val="0"/>
+                        </a:spcAft>
+                        <a:buNone/>
+                      </a:pPr>
+                      <a:endParaRPr dirty="0"/>
+                    </a:p>
+                  </a:txBody>
+                  <a:tcPr marL="91425" marR="91425" marT="91425" marB="91425"/>
+                </a:tc>
+                <a:tc>
+                  <a:txBody>
+                    <a:bodyPr/>
+                    <a:lstStyle/>
+                    <a:p>
+                      <a:pPr marL="0" lvl="0" indent="0" algn="l" rtl="0">
+                        <a:spcBef>
+                          <a:spcPts val="0"/>
+                        </a:spcBef>
+                        <a:spcAft>
+                          <a:spcPts val="0"/>
+                        </a:spcAft>
+                        <a:buNone/>
+                      </a:pPr>
+                      <a:endParaRPr dirty="0"/>
+                    </a:p>
+                  </a:txBody>
+                  <a:tcPr marL="91425" marR="91425" marT="91425" marB="91425"/>
+                </a:tc>
+                <a:extLst>
+                  <a:ext uri="{0D108BD9-81ED-4DB2-BD59-A6C34878D82A}">
+                    <a16:rowId xmlns:a16="http://schemas.microsoft.com/office/drawing/2014/main" val="10002"/>
+                  </a:ext>
+                </a:extLst>
+              </a:tr>
+            </a:tbl>
+          </a:graphicData>
+        </a:graphic>
+      </p:graphicFrame>
+      <p:pic>
+        <p:nvPicPr>
+          <p:cNvPr id="3" name="Picture 2">
+            <a:extLst>
+              <a:ext uri="{FF2B5EF4-FFF2-40B4-BE49-F238E27FC236}">
+                <a16:creationId xmlns:a16="http://schemas.microsoft.com/office/drawing/2014/main" id="{2441815C-19F6-4410-9226-EEF914C90527}"/>
+              </a:ext>
+            </a:extLst>
+          </p:cNvPr>
+          <p:cNvPicPr>
+            <a:picLocks noChangeAspect="1"/>
+          </p:cNvPicPr>
+          <p:nvPr/>
+        </p:nvPicPr>
+        <p:blipFill>
+          <a:blip r:embed="rId3"/>
+          <a:stretch>
+            <a:fillRect/>
+          </a:stretch>
+        </p:blipFill>
         <p:spPr>
           <a:xfrm>
-            <a:off x="311700" y="1152475"/>
-            <a:ext cx="8520600" cy="3416400"/>
+            <a:off x="1457149" y="3335153"/>
+            <a:ext cx="1281942" cy="1544854"/>
           </a:xfrm>
           <a:prstGeom prst="rect">
             <a:avLst/>
           </a:prstGeom>
         </p:spPr>
-        <p:txBody>
-          <a:bodyPr spcFirstLastPara="1" wrap="square" lIns="91425" tIns="91425" rIns="91425" bIns="91425" anchor="t" anchorCtr="0">
-            <a:normAutofit/>
-          </a:bodyPr>
-          <a:lstStyle/>
-          <a:p>
-            <a:pPr marL="0" lvl="0" indent="0" algn="l" rtl="0">
-              <a:spcBef>
-                <a:spcPts val="0"/>
-              </a:spcBef>
-              <a:spcAft>
-                <a:spcPts val="1200"/>
-              </a:spcAft>
-              <a:buNone/>
-            </a:pPr>
-            <a:endParaRPr/>
-          </a:p>
-        </p:txBody>
-      </p:sp>
-    </p:spTree>
-  </p:cSld>
-  <p:clrMapOvr>
-    <a:masterClrMapping/>
-  </p:clrMapOvr>
-</p:sld>
-</file>
-
-<file path=ppt/slides/slide19.xml><?xml version="1.0" encoding="utf-8"?>
-<p:sld xmlns:a="http://schemas.openxmlformats.org/drawingml/2006/main" xmlns:r="http://schemas.openxmlformats.org/officeDocument/2006/relationships" xmlns:p="http://schemas.openxmlformats.org/presentationml/2006/main">
-  <p:cSld>
-    <p:spTree>
-      <p:nvGrpSpPr>
-        <p:cNvPr id="1" name="Shape 161"/>
-        <p:cNvGrpSpPr/>
-        <p:nvPr/>
-      </p:nvGrpSpPr>
-      <p:grpSpPr>
-        <a:xfrm>
-          <a:off x="0" y="0"/>
-          <a:ext cx="0" cy="0"/>
-          <a:chOff x="0" y="0"/>
-          <a:chExt cx="0" cy="0"/>
-        </a:xfrm>
-      </p:grpSpPr>
-      <p:sp>
-        <p:nvSpPr>
-          <p:cNvPr id="162" name="Google Shape;162;p31"/>
-          <p:cNvSpPr txBox="1">
-            <a:spLocks noGrp="1"/>
-          </p:cNvSpPr>
-          <p:nvPr>
-            <p:ph type="title"/>
-          </p:nvPr>
-        </p:nvSpPr>
+      </p:pic>
+      <p:pic>
+        <p:nvPicPr>
+          <p:cNvPr id="6" name="Picture 5">
+            <a:extLst>
+              <a:ext uri="{FF2B5EF4-FFF2-40B4-BE49-F238E27FC236}">
+                <a16:creationId xmlns:a16="http://schemas.microsoft.com/office/drawing/2014/main" id="{EC5D80AF-9951-421F-B2E6-6817C03CF80F}"/>
+              </a:ext>
+            </a:extLst>
+          </p:cNvPr>
+          <p:cNvPicPr>
+            <a:picLocks noChangeAspect="1"/>
+          </p:cNvPicPr>
+          <p:nvPr/>
+        </p:nvPicPr>
+        <p:blipFill>
+          <a:blip r:embed="rId4"/>
+          <a:stretch>
+            <a:fillRect/>
+          </a:stretch>
+        </p:blipFill>
         <p:spPr>
           <a:xfrm>
-            <a:off x="311700" y="445025"/>
-            <a:ext cx="8520600" cy="572700"/>
+            <a:off x="1457149" y="1808345"/>
+            <a:ext cx="1281943" cy="1526808"/>
           </a:xfrm>
           <a:prstGeom prst="rect">
             <a:avLst/>
           </a:prstGeom>
         </p:spPr>
-        <p:txBody>
-          <a:bodyPr spcFirstLastPara="1" wrap="square" lIns="91425" tIns="91425" rIns="91425" bIns="91425" anchor="t" anchorCtr="0">
-            <a:normAutofit fontScale="90000"/>
-          </a:bodyPr>
-          <a:lstStyle/>
-          <a:p>
-            <a:pPr marL="0" lvl="0" indent="0" algn="l" rtl="0">
-              <a:spcBef>
-                <a:spcPts val="0"/>
-              </a:spcBef>
-              <a:spcAft>
-                <a:spcPts val="0"/>
-              </a:spcAft>
-              <a:buNone/>
-            </a:pPr>
-            <a:r>
-              <a:rPr lang="en"/>
-              <a:t>Conclusion</a:t>
-            </a:r>
-            <a:endParaRPr/>
-          </a:p>
-        </p:txBody>
-      </p:sp>
-      <p:sp>
-        <p:nvSpPr>
-          <p:cNvPr id="163" name="Google Shape;163;p31"/>
-          <p:cNvSpPr txBox="1">
-            <a:spLocks noGrp="1"/>
-          </p:cNvSpPr>
-          <p:nvPr>
-            <p:ph type="body" idx="1"/>
-          </p:nvPr>
-        </p:nvSpPr>
-        <p:spPr>
-          <a:xfrm>
-            <a:off x="311700" y="1152475"/>
-            <a:ext cx="8520600" cy="3416400"/>
-          </a:xfrm>
-          <a:prstGeom prst="rect">
-            <a:avLst/>
-          </a:prstGeom>
-        </p:spPr>
-        <p:txBody>
-          <a:bodyPr spcFirstLastPara="1" wrap="square" lIns="91425" tIns="91425" rIns="91425" bIns="91425" anchor="t" anchorCtr="0">
-            <a:normAutofit/>
-          </a:bodyPr>
-          <a:lstStyle/>
-          <a:p>
-            <a:pPr marL="0" lvl="0" indent="0" algn="l" rtl="0">
-              <a:spcBef>
-                <a:spcPts val="0"/>
-              </a:spcBef>
-              <a:spcAft>
-                <a:spcPts val="1200"/>
-              </a:spcAft>
-              <a:buNone/>
-            </a:pPr>
-            <a:endParaRPr/>
-          </a:p>
-        </p:txBody>
-      </p:sp>
+      </p:pic>
     </p:spTree>
   </p:cSld>
   <p:clrMapOvr>
@@ -9368,7 +10623,29 @@
                   <a:schemeClr val="tx1"/>
                 </a:solidFill>
               </a:rPr>
-              <a:t>Train a Machine Learning Agent play the video game Seaquest</a:t>
+              <a:t>High level goal for this project:</a:t>
+            </a:r>
+          </a:p>
+          <a:p>
+            <a:pPr marL="0" lvl="0" indent="0" algn="l" rtl="0">
+              <a:lnSpc>
+                <a:spcPts val="900"/>
+              </a:lnSpc>
+              <a:spcBef>
+                <a:spcPts val="0"/>
+              </a:spcBef>
+              <a:spcAft>
+                <a:spcPts val="1200"/>
+              </a:spcAft>
+              <a:buNone/>
+            </a:pPr>
+            <a:r>
+              <a:rPr lang="en" sz="1000" dirty="0">
+                <a:solidFill>
+                  <a:schemeClr val="tx1"/>
+                </a:solidFill>
+              </a:rPr>
+              <a:t>Train a Machine Learning Agent play the video game Seaquest and visualize the agent’s attention, or using that for augmentation</a:t>
             </a:r>
           </a:p>
           <a:p>
@@ -9390,6 +10667,39 @@
               </a:rPr>
               <a:t>Overview of the problem</a:t>
             </a:r>
+          </a:p>
+          <a:p>
+            <a:pPr marL="171450" indent="-171450">
+              <a:lnSpc>
+                <a:spcPts val="900"/>
+              </a:lnSpc>
+              <a:spcAft>
+                <a:spcPts val="1200"/>
+              </a:spcAft>
+              <a:buFont typeface="Arial" panose="020B0604020202020204" pitchFamily="34" charset="0"/>
+              <a:buChar char="•"/>
+            </a:pPr>
+            <a:r>
+              <a:rPr lang="en-US" sz="1000" dirty="0">
+                <a:solidFill>
+                  <a:schemeClr val="tx1"/>
+                </a:solidFill>
+              </a:rPr>
+              <a:t>State of the Art Performance on </a:t>
+            </a:r>
+            <a:r>
+              <a:rPr lang="en-US" sz="1000" dirty="0" err="1">
+                <a:solidFill>
+                  <a:schemeClr val="tx1"/>
+                </a:solidFill>
+              </a:rPr>
+              <a:t>Seaquest</a:t>
+            </a:r>
+            <a:endParaRPr lang="en-US" sz="1000" dirty="0">
+              <a:solidFill>
+                <a:schemeClr val="tx1"/>
+              </a:solidFill>
+            </a:endParaRPr>
           </a:p>
           <a:p>
             <a:pPr marL="171450" indent="-171450">
@@ -9555,8 +10865,8 @@
         </p:blipFill>
         <p:spPr>
           <a:xfrm>
-            <a:off x="5653854" y="1232619"/>
-            <a:ext cx="2691249" cy="1723960"/>
+            <a:off x="6141051" y="1648184"/>
+            <a:ext cx="2691249" cy="2424981"/>
           </a:xfrm>
           <a:prstGeom prst="rect">
             <a:avLst/>
@@ -9572,6 +10882,111 @@
 </file>
 
 <file path=ppt/slides/slide20.xml><?xml version="1.0" encoding="utf-8"?>
+<p:sld xmlns:a="http://schemas.openxmlformats.org/drawingml/2006/main" xmlns:r="http://schemas.openxmlformats.org/officeDocument/2006/relationships" xmlns:p="http://schemas.openxmlformats.org/presentationml/2006/main">
+  <p:cSld>
+    <p:spTree>
+      <p:nvGrpSpPr>
+        <p:cNvPr id="1" name="Shape 161"/>
+        <p:cNvGrpSpPr/>
+        <p:nvPr/>
+      </p:nvGrpSpPr>
+      <p:grpSpPr>
+        <a:xfrm>
+          <a:off x="0" y="0"/>
+          <a:ext cx="0" cy="0"/>
+          <a:chOff x="0" y="0"/>
+          <a:chExt cx="0" cy="0"/>
+        </a:xfrm>
+      </p:grpSpPr>
+      <p:sp>
+        <p:nvSpPr>
+          <p:cNvPr id="162" name="Google Shape;162;p31"/>
+          <p:cNvSpPr txBox="1">
+            <a:spLocks noGrp="1"/>
+          </p:cNvSpPr>
+          <p:nvPr>
+            <p:ph type="title"/>
+          </p:nvPr>
+        </p:nvSpPr>
+        <p:spPr>
+          <a:xfrm>
+            <a:off x="311700" y="445025"/>
+            <a:ext cx="8520600" cy="572700"/>
+          </a:xfrm>
+          <a:prstGeom prst="rect">
+            <a:avLst/>
+          </a:prstGeom>
+        </p:spPr>
+        <p:txBody>
+          <a:bodyPr spcFirstLastPara="1" wrap="square" lIns="91425" tIns="91425" rIns="91425" bIns="91425" anchor="t" anchorCtr="0">
+            <a:normAutofit fontScale="90000"/>
+          </a:bodyPr>
+          <a:lstStyle/>
+          <a:p>
+            <a:pPr marL="0" lvl="0" indent="0" algn="l" rtl="0">
+              <a:spcBef>
+                <a:spcPts val="0"/>
+              </a:spcBef>
+              <a:spcAft>
+                <a:spcPts val="0"/>
+              </a:spcAft>
+              <a:buNone/>
+            </a:pPr>
+            <a:r>
+              <a:rPr lang="en"/>
+              <a:t>Conclusion</a:t>
+            </a:r>
+            <a:endParaRPr/>
+          </a:p>
+        </p:txBody>
+      </p:sp>
+      <p:sp>
+        <p:nvSpPr>
+          <p:cNvPr id="163" name="Google Shape;163;p31"/>
+          <p:cNvSpPr txBox="1">
+            <a:spLocks noGrp="1"/>
+          </p:cNvSpPr>
+          <p:nvPr>
+            <p:ph type="body" idx="1"/>
+          </p:nvPr>
+        </p:nvSpPr>
+        <p:spPr>
+          <a:xfrm>
+            <a:off x="311700" y="1152475"/>
+            <a:ext cx="8520600" cy="3416400"/>
+          </a:xfrm>
+          <a:prstGeom prst="rect">
+            <a:avLst/>
+          </a:prstGeom>
+        </p:spPr>
+        <p:txBody>
+          <a:bodyPr spcFirstLastPara="1" wrap="square" lIns="91425" tIns="91425" rIns="91425" bIns="91425" anchor="t" anchorCtr="0">
+            <a:normAutofit/>
+          </a:bodyPr>
+          <a:lstStyle/>
+          <a:p>
+            <a:pPr marL="0" lvl="0" indent="0" algn="l" rtl="0">
+              <a:spcBef>
+                <a:spcPts val="0"/>
+              </a:spcBef>
+              <a:spcAft>
+                <a:spcPts val="1200"/>
+              </a:spcAft>
+              <a:buNone/>
+            </a:pPr>
+            <a:endParaRPr dirty="0"/>
+          </a:p>
+        </p:txBody>
+      </p:sp>
+    </p:spTree>
+  </p:cSld>
+  <p:clrMapOvr>
+    <a:masterClrMapping/>
+  </p:clrMapOvr>
+</p:sld>
+</file>
+
+<file path=ppt/slides/slide21.xml><?xml version="1.0" encoding="utf-8"?>
 <p:sld xmlns:a="http://schemas.openxmlformats.org/drawingml/2006/main" xmlns:r="http://schemas.openxmlformats.org/officeDocument/2006/relationships" xmlns:p="http://schemas.openxmlformats.org/presentationml/2006/main">
   <p:cSld>
     <p:spTree>
@@ -9623,10 +11038,10 @@
               <a:buNone/>
             </a:pPr>
             <a:r>
-              <a:rPr lang="en"/>
+              <a:rPr lang="en" dirty="0"/>
               <a:t>Further Improvements</a:t>
             </a:r>
-            <a:endParaRPr/>
+            <a:endParaRPr dirty="0"/>
           </a:p>
         </p:txBody>
       </p:sp>
@@ -9664,7 +11079,148 @@
               </a:spcAft>
               <a:buNone/>
             </a:pPr>
-            <a:endParaRPr dirty="0"/>
+            <a:r>
+              <a:rPr lang="en-US" dirty="0">
+                <a:solidFill>
+                  <a:schemeClr val="tx1"/>
+                </a:solidFill>
+              </a:rPr>
+              <a:t>Update the RL Algorithm to Asynchronous Advantage Actor Critic (AC3)</a:t>
+            </a:r>
+          </a:p>
+          <a:p>
+            <a:pPr marL="0" lvl="0" indent="0" algn="l" rtl="0">
+              <a:spcBef>
+                <a:spcPts val="0"/>
+              </a:spcBef>
+              <a:spcAft>
+                <a:spcPts val="0"/>
+              </a:spcAft>
+              <a:buNone/>
+            </a:pPr>
+            <a:endParaRPr lang="en-US" dirty="0">
+              <a:solidFill>
+                <a:schemeClr val="tx1"/>
+              </a:solidFill>
+            </a:endParaRPr>
+          </a:p>
+          <a:p>
+            <a:pPr marL="0" lvl="0" indent="0" algn="l" rtl="0">
+              <a:spcBef>
+                <a:spcPts val="0"/>
+              </a:spcBef>
+              <a:spcAft>
+                <a:spcPts val="0"/>
+              </a:spcAft>
+              <a:buNone/>
+            </a:pPr>
+            <a:r>
+              <a:rPr lang="en-US" dirty="0">
+                <a:solidFill>
+                  <a:schemeClr val="tx1"/>
+                </a:solidFill>
+              </a:rPr>
+              <a:t>Update the model output to dueling for policy and value prediction</a:t>
+            </a:r>
+          </a:p>
+          <a:p>
+            <a:pPr marL="0" lvl="0" indent="0" algn="l" rtl="0">
+              <a:spcBef>
+                <a:spcPts val="0"/>
+              </a:spcBef>
+              <a:spcAft>
+                <a:spcPts val="0"/>
+              </a:spcAft>
+              <a:buNone/>
+            </a:pPr>
+            <a:endParaRPr lang="en-US" dirty="0">
+              <a:solidFill>
+                <a:schemeClr val="tx1"/>
+              </a:solidFill>
+            </a:endParaRPr>
+          </a:p>
+          <a:p>
+            <a:pPr marL="0" lvl="0" indent="0" algn="l" rtl="0">
+              <a:spcBef>
+                <a:spcPts val="0"/>
+              </a:spcBef>
+              <a:spcAft>
+                <a:spcPts val="0"/>
+              </a:spcAft>
+              <a:buNone/>
+            </a:pPr>
+            <a:r>
+              <a:rPr lang="en-US" dirty="0">
+                <a:solidFill>
+                  <a:schemeClr val="tx1"/>
+                </a:solidFill>
+              </a:rPr>
+              <a:t>Change the recurrent connection to transformer network</a:t>
+            </a:r>
+          </a:p>
+          <a:p>
+            <a:pPr marL="0" lvl="0" indent="0" algn="l" rtl="0">
+              <a:spcBef>
+                <a:spcPts val="0"/>
+              </a:spcBef>
+              <a:spcAft>
+                <a:spcPts val="0"/>
+              </a:spcAft>
+              <a:buNone/>
+            </a:pPr>
+            <a:endParaRPr lang="en-US" dirty="0">
+              <a:solidFill>
+                <a:schemeClr val="tx1"/>
+              </a:solidFill>
+            </a:endParaRPr>
+          </a:p>
+          <a:p>
+            <a:pPr marL="0" lvl="0" indent="0" algn="l" rtl="0">
+              <a:spcBef>
+                <a:spcPts val="0"/>
+              </a:spcBef>
+              <a:spcAft>
+                <a:spcPts val="0"/>
+              </a:spcAft>
+              <a:buNone/>
+            </a:pPr>
+            <a:endParaRPr lang="en-US" dirty="0">
+              <a:solidFill>
+                <a:schemeClr val="tx1"/>
+              </a:solidFill>
+            </a:endParaRPr>
+          </a:p>
+          <a:p>
+            <a:pPr marL="0" lvl="0" indent="0" algn="l" rtl="0">
+              <a:spcBef>
+                <a:spcPts val="0"/>
+              </a:spcBef>
+              <a:spcAft>
+                <a:spcPts val="0"/>
+              </a:spcAft>
+              <a:buNone/>
+            </a:pPr>
+            <a:endParaRPr lang="en-US" dirty="0">
+              <a:solidFill>
+                <a:schemeClr val="tx1"/>
+              </a:solidFill>
+            </a:endParaRPr>
+          </a:p>
+          <a:p>
+            <a:pPr marL="0" lvl="0" indent="0" algn="l" rtl="0">
+              <a:spcBef>
+                <a:spcPts val="0"/>
+              </a:spcBef>
+              <a:spcAft>
+                <a:spcPts val="0"/>
+              </a:spcAft>
+              <a:buNone/>
+            </a:pPr>
+            <a:endParaRPr dirty="0">
+              <a:solidFill>
+                <a:schemeClr val="tx1"/>
+              </a:solidFill>
+            </a:endParaRPr>
           </a:p>
         </p:txBody>
       </p:sp>
@@ -9676,7 +11232,7 @@
 </p:sld>
 </file>
 
-<file path=ppt/slides/slide21.xml><?xml version="1.0" encoding="utf-8"?>
+<file path=ppt/slides/slide22.xml><?xml version="1.0" encoding="utf-8"?>
 <p:sld xmlns:a="http://schemas.openxmlformats.org/drawingml/2006/main" xmlns:r="http://schemas.openxmlformats.org/officeDocument/2006/relationships" xmlns:p="http://schemas.openxmlformats.org/presentationml/2006/main">
   <p:cSld>
     <p:spTree>
@@ -9872,8 +11428,8 @@
           </a:p>
         </p:txBody>
       </p:sp>
-      <mc:AlternateContent xmlns:mc="http://schemas.openxmlformats.org/markup-compatibility/2006">
-        <mc:Choice xmlns:a14="http://schemas.microsoft.com/office/drawing/2010/main" Requires="a14">
+      <mc:AlternateContent xmlns:mc="http://schemas.openxmlformats.org/markup-compatibility/2006" xmlns:a14="http://schemas.microsoft.com/office/drawing/2010/main">
+        <mc:Choice Requires="a14">
           <p:sp>
             <p:nvSpPr>
               <p:cNvPr id="67" name="Google Shape;67;p15"/>
@@ -10151,7 +11707,61 @@
                         </a:solidFill>
                         <a:latin typeface="Cambria Math" panose="02040503050406030204" pitchFamily="18" charset="0"/>
                       </a:rPr>
-                      <m:t>∈{0, 1, …, 17}</m:t>
+                      <m:t>∈{</m:t>
+                    </m:r>
+                    <m:r>
+                      <a:rPr lang="en-US" sz="1200" b="0" i="1" smtClean="0">
+                        <a:solidFill>
+                          <a:schemeClr val="tx1"/>
+                        </a:solidFill>
+                        <a:latin typeface="Cambria Math" panose="02040503050406030204" pitchFamily="18" charset="0"/>
+                      </a:rPr>
+                      <m:t>0</m:t>
+                    </m:r>
+                    <m:r>
+                      <a:rPr lang="en-US" sz="1200" b="0" i="1" smtClean="0">
+                        <a:solidFill>
+                          <a:schemeClr val="tx1"/>
+                        </a:solidFill>
+                        <a:latin typeface="Cambria Math" panose="02040503050406030204" pitchFamily="18" charset="0"/>
+                      </a:rPr>
+                      <m:t>, </m:t>
+                    </m:r>
+                    <m:r>
+                      <a:rPr lang="en-US" sz="1200" b="0" i="1" smtClean="0">
+                        <a:solidFill>
+                          <a:schemeClr val="tx1"/>
+                        </a:solidFill>
+                        <a:latin typeface="Cambria Math" panose="02040503050406030204" pitchFamily="18" charset="0"/>
+                      </a:rPr>
+                      <m:t>1</m:t>
+                    </m:r>
+                    <m:r>
+                      <a:rPr lang="en-US" sz="1200" b="0" i="1" smtClean="0">
+                        <a:solidFill>
+                          <a:schemeClr val="tx1"/>
+                        </a:solidFill>
+                        <a:latin typeface="Cambria Math" panose="02040503050406030204" pitchFamily="18" charset="0"/>
+                      </a:rPr>
+                      <m:t>, …, </m:t>
+                    </m:r>
+                    <m:r>
+                      <a:rPr lang="en-US" sz="1200" b="0" i="1" smtClean="0">
+                        <a:solidFill>
+                          <a:schemeClr val="tx1"/>
+                        </a:solidFill>
+                        <a:latin typeface="Cambria Math" panose="02040503050406030204" pitchFamily="18" charset="0"/>
+                      </a:rPr>
+                      <m:t>17</m:t>
+                    </m:r>
+                    <m:r>
+                      <a:rPr lang="en-US" sz="1200" b="0" i="1" smtClean="0">
+                        <a:solidFill>
+                          <a:schemeClr val="tx1"/>
+                        </a:solidFill>
+                        <a:latin typeface="Cambria Math" panose="02040503050406030204" pitchFamily="18" charset="0"/>
+                      </a:rPr>
+                      <m:t>}</m:t>
                     </m:r>
                   </m:oMath>
                 </a14:m>
@@ -10703,7 +12313,7 @@
             </p:txBody>
           </p:sp>
         </mc:Choice>
-        <mc:Fallback>
+        <mc:Fallback xmlns="">
           <p:sp>
             <p:nvSpPr>
               <p:cNvPr id="67" name="Google Shape;67;p15"/>
@@ -10880,8 +12490,8 @@
           </a:p>
         </p:txBody>
       </p:sp>
-      <mc:AlternateContent xmlns:mc="http://schemas.openxmlformats.org/markup-compatibility/2006">
-        <mc:Choice xmlns:a14="http://schemas.microsoft.com/office/drawing/2010/main" Requires="a14">
+      <mc:AlternateContent xmlns:mc="http://schemas.openxmlformats.org/markup-compatibility/2006" xmlns:a14="http://schemas.microsoft.com/office/drawing/2010/main">
+        <mc:Choice Requires="a14">
           <p:sp>
             <p:nvSpPr>
               <p:cNvPr id="8" name="TextBox 7">
@@ -10919,6 +12529,7 @@
                 <a:endParaRPr lang="en-US" dirty="0"/>
               </a:p>
               <a:p>
+                <a:pPr/>
                 <a14:m>
                   <m:oMathPara xmlns:m="http://schemas.openxmlformats.org/officeDocument/2006/math">
                     <m:oMathParaPr>
@@ -10966,7 +12577,19 @@
                         <a:rPr lang="en-US" b="0" i="1" smtClean="0">
                           <a:latin typeface="Cambria Math" panose="02040503050406030204" pitchFamily="18" charset="0"/>
                         </a:rPr>
-                        <m:t>, 45)</m:t>
+                        <m:t>, </m:t>
+                      </m:r>
+                      <m:r>
+                        <a:rPr lang="en-US" b="0" i="1" smtClean="0">
+                          <a:latin typeface="Cambria Math" panose="02040503050406030204" pitchFamily="18" charset="0"/>
+                        </a:rPr>
+                        <m:t>45</m:t>
+                      </m:r>
+                      <m:r>
+                        <a:rPr lang="en-US" b="0" i="1" smtClean="0">
+                          <a:latin typeface="Cambria Math" panose="02040503050406030204" pitchFamily="18" charset="0"/>
+                        </a:rPr>
+                        <m:t>)</m:t>
                       </m:r>
                     </m:oMath>
                   </m:oMathPara>
@@ -10976,7 +12599,7 @@
             </p:txBody>
           </p:sp>
         </mc:Choice>
-        <mc:Fallback>
+        <mc:Fallback xmlns="">
           <p:sp>
             <p:nvSpPr>
               <p:cNvPr id="8" name="TextBox 7">
@@ -11112,14 +12735,14 @@
             </a:pPr>
             <a:r>
               <a:rPr lang="en" dirty="0"/>
-              <a:t>Markov Decision Process (MDP)</a:t>
+              <a:t>RL Theory: Markov Decision Process (MDP)</a:t>
             </a:r>
             <a:endParaRPr dirty="0"/>
           </a:p>
         </p:txBody>
       </p:sp>
-      <mc:AlternateContent xmlns:mc="http://schemas.openxmlformats.org/markup-compatibility/2006">
-        <mc:Choice xmlns:a14="http://schemas.microsoft.com/office/drawing/2010/main" Requires="a14">
+      <mc:AlternateContent xmlns:mc="http://schemas.openxmlformats.org/markup-compatibility/2006" xmlns:a14="http://schemas.microsoft.com/office/drawing/2010/main">
+        <mc:Choice Requires="a14">
           <p:sp>
             <p:nvSpPr>
               <p:cNvPr id="79" name="Google Shape;79;p17"/>
@@ -11320,7 +12943,16 @@
                               </a:solidFill>
                               <a:latin typeface="Cambria Math" panose="02040503050406030204" pitchFamily="18" charset="0"/>
                             </a:rPr>
-                            <m:t>=0</m:t>
+                            <m:t>=</m:t>
+                          </m:r>
+                          <m:r>
+                            <a:rPr lang="en-US" b="0" i="1" smtClean="0">
+                              <a:solidFill>
+                                <a:schemeClr val="tx1"/>
+                              </a:solidFill>
+                              <a:latin typeface="Cambria Math" panose="02040503050406030204" pitchFamily="18" charset="0"/>
+                            </a:rPr>
+                            <m:t>0</m:t>
                           </m:r>
                         </m:sub>
                         <m:sup>
@@ -11340,7 +12972,16 @@
                               </a:solidFill>
                               <a:latin typeface="Cambria Math" panose="02040503050406030204" pitchFamily="18" charset="0"/>
                             </a:rPr>
-                            <m:t>−1</m:t>
+                            <m:t>−</m:t>
+                          </m:r>
+                          <m:r>
+                            <a:rPr lang="en-US" b="0" i="1" smtClean="0">
+                              <a:solidFill>
+                                <a:schemeClr val="tx1"/>
+                              </a:solidFill>
+                              <a:latin typeface="Cambria Math" panose="02040503050406030204" pitchFamily="18" charset="0"/>
+                            </a:rPr>
+                            <m:t>1</m:t>
                           </m:r>
                         </m:sup>
                         <m:e>
@@ -11426,7 +13067,16 @@
                                   </a:solidFill>
                                   <a:latin typeface="Cambria Math" panose="02040503050406030204" pitchFamily="18" charset="0"/>
                                 </a:rPr>
-                                <m:t>+1</m:t>
+                                <m:t>+</m:t>
+                              </m:r>
+                              <m:r>
+                                <a:rPr lang="en-US" b="0" i="1" smtClean="0">
+                                  <a:solidFill>
+                                    <a:schemeClr val="tx1"/>
+                                  </a:solidFill>
+                                  <a:latin typeface="Cambria Math" panose="02040503050406030204" pitchFamily="18" charset="0"/>
+                                </a:rPr>
+                                <m:t>1</m:t>
                               </m:r>
                             </m:sub>
                           </m:sSub>
@@ -11590,7 +13240,16 @@
                                   </a:solidFill>
                                   <a:latin typeface="Cambria Math" panose="02040503050406030204" pitchFamily="18" charset="0"/>
                                 </a:rPr>
-                                <m:t>+1</m:t>
+                                <m:t>+</m:t>
+                              </m:r>
+                              <m:r>
+                                <a:rPr lang="en-US" b="0" i="1" smtClean="0">
+                                  <a:solidFill>
+                                    <a:schemeClr val="tx1"/>
+                                  </a:solidFill>
+                                  <a:latin typeface="Cambria Math" panose="02040503050406030204" pitchFamily="18" charset="0"/>
+                                </a:rPr>
+                                <m:t>1</m:t>
                               </m:r>
                             </m:sub>
                           </m:sSub>
@@ -11791,7 +13450,16 @@
                               </a:solidFill>
                               <a:latin typeface="Cambria Math" panose="02040503050406030204" pitchFamily="18" charset="0"/>
                             </a:rPr>
-                            <m:t>+1</m:t>
+                            <m:t>+</m:t>
+                          </m:r>
+                          <m:r>
+                            <a:rPr lang="en-US" b="0" i="1" smtClean="0">
+                              <a:solidFill>
+                                <a:schemeClr val="tx1"/>
+                              </a:solidFill>
+                              <a:latin typeface="Cambria Math" panose="02040503050406030204" pitchFamily="18" charset="0"/>
+                            </a:rPr>
+                            <m:t>1</m:t>
                           </m:r>
                         </m:sub>
                       </m:sSub>
@@ -12160,7 +13828,7 @@
             </p:txBody>
           </p:sp>
         </mc:Choice>
-        <mc:Fallback>
+        <mc:Fallback xmlns="">
           <p:sp>
             <p:nvSpPr>
               <p:cNvPr id="79" name="Google Shape;79;p17"/>
@@ -12315,8 +13983,8 @@
           </a:p>
         </p:txBody>
       </p:sp>
-      <mc:AlternateContent xmlns:mc="http://schemas.openxmlformats.org/markup-compatibility/2006">
-        <mc:Choice xmlns:a14="http://schemas.microsoft.com/office/drawing/2010/main" Requires="a14">
+      <mc:AlternateContent xmlns:mc="http://schemas.openxmlformats.org/markup-compatibility/2006" xmlns:a14="http://schemas.microsoft.com/office/drawing/2010/main">
+        <mc:Choice Requires="a14">
           <p:sp>
             <p:nvSpPr>
               <p:cNvPr id="85" name="Google Shape;85;p18"/>
@@ -12714,19 +14382,7 @@
                                   </a:solidFill>
                                   <a:latin typeface="Cambria Math" panose="02040503050406030204" pitchFamily="18" charset="0"/>
                                 </a:rPr>
-                                <m:t>arg</m:t>
-                              </m:r>
-                              <m:r>
-                                <m:rPr>
-                                  <m:sty m:val="p"/>
-                                </m:rPr>
-                                <a:rPr lang="en-US" b="0" i="0" smtClean="0">
-                                  <a:solidFill>
-                                    <a:schemeClr val="tx1"/>
-                                  </a:solidFill>
-                                  <a:latin typeface="Cambria Math" panose="02040503050406030204" pitchFamily="18" charset="0"/>
-                                </a:rPr>
-                                <m:t>max</m:t>
+                                <m:t>argmax</m:t>
                               </m:r>
                             </m:e>
                             <m:lim>
@@ -13089,7 +14745,7 @@
             </p:txBody>
           </p:sp>
         </mc:Choice>
-        <mc:Fallback>
+        <mc:Fallback xmlns="">
           <p:sp>
             <p:nvSpPr>
               <p:cNvPr id="85" name="Google Shape;85;p18"/>
@@ -13197,8 +14853,8 @@
           </a:p>
         </p:txBody>
       </p:sp>
-      <mc:AlternateContent xmlns:mc="http://schemas.openxmlformats.org/markup-compatibility/2006">
-        <mc:Choice xmlns:a14="http://schemas.microsoft.com/office/drawing/2010/main" Requires="a14">
+      <mc:AlternateContent xmlns:mc="http://schemas.openxmlformats.org/markup-compatibility/2006" xmlns:a14="http://schemas.microsoft.com/office/drawing/2010/main">
+        <mc:Choice Requires="a14">
           <p:sp>
             <p:nvSpPr>
               <p:cNvPr id="91" name="Google Shape;91;p19"/>
@@ -14790,7 +16446,7 @@
             </p:txBody>
           </p:sp>
         </mc:Choice>
-        <mc:Fallback>
+        <mc:Fallback xmlns="">
           <p:sp>
             <p:nvSpPr>
               <p:cNvPr id="91" name="Google Shape;91;p19"/>
@@ -14898,8 +16554,8 @@
           </a:p>
         </p:txBody>
       </p:sp>
-      <mc:AlternateContent xmlns:mc="http://schemas.openxmlformats.org/markup-compatibility/2006">
-        <mc:Choice xmlns:a14="http://schemas.microsoft.com/office/drawing/2010/main" Requires="a14">
+      <mc:AlternateContent xmlns:mc="http://schemas.openxmlformats.org/markup-compatibility/2006" xmlns:a14="http://schemas.microsoft.com/office/drawing/2010/main">
+        <mc:Choice Requires="a14">
           <p:sp>
             <p:nvSpPr>
               <p:cNvPr id="97" name="Google Shape;97;p20"/>
@@ -15230,7 +16886,7 @@
                       <a:schemeClr val="tx1"/>
                     </a:solidFill>
                   </a:rPr>
-                  <a:t>Problem: Our environment observation is not strictly markov: 1 image of game observation is partially observable (loss of information)</a:t>
+                  <a:t>Problem: Our environment observation is not markov: 1 image of game observation is partially observable (loss of information)</a:t>
                 </a:r>
               </a:p>
               <a:p>
@@ -15306,7 +16962,7 @@
             </p:txBody>
           </p:sp>
         </mc:Choice>
-        <mc:Fallback>
+        <mc:Fallback xmlns="">
           <p:sp>
             <p:nvSpPr>
               <p:cNvPr id="97" name="Google Shape;97;p20"/>
@@ -15523,166 +17179,303 @@
           </a:p>
         </p:txBody>
       </p:sp>
-      <p:sp>
-        <p:nvSpPr>
-          <p:cNvPr id="3" name="Text Placeholder 2">
+      <mc:AlternateContent xmlns:mc="http://schemas.openxmlformats.org/markup-compatibility/2006">
+        <mc:Choice xmlns:a14="http://schemas.microsoft.com/office/drawing/2010/main" Requires="a14">
+          <p:sp>
+            <p:nvSpPr>
+              <p:cNvPr id="3" name="Text Placeholder 2">
+                <a:extLst>
+                  <a:ext uri="{FF2B5EF4-FFF2-40B4-BE49-F238E27FC236}">
+                    <a16:creationId xmlns:a16="http://schemas.microsoft.com/office/drawing/2014/main" id="{6CCC3D13-19FE-4617-A199-6A62AC33AFFF}"/>
+                  </a:ext>
+                </a:extLst>
+              </p:cNvPr>
+              <p:cNvSpPr>
+                <a:spLocks noGrp="1"/>
+              </p:cNvSpPr>
+              <p:nvPr>
+                <p:ph type="body" idx="1"/>
+              </p:nvPr>
+            </p:nvSpPr>
+            <p:spPr/>
+            <p:txBody>
+              <a:bodyPr>
+                <a:normAutofit/>
+              </a:bodyPr>
+              <a:lstStyle/>
+              <a:p>
+                <a:pPr marL="0" lvl="0" indent="0" algn="l" rtl="0">
+                  <a:spcBef>
+                    <a:spcPts val="1200"/>
+                  </a:spcBef>
+                  <a:spcAft>
+                    <a:spcPts val="0"/>
+                  </a:spcAft>
+                  <a:buNone/>
+                </a:pPr>
+                <a:r>
+                  <a:rPr lang="en-US" sz="1400" dirty="0">
+                    <a:solidFill>
+                      <a:schemeClr val="tx1"/>
+                    </a:solidFill>
+                  </a:rPr>
+                  <a:t>Solutions to Policy Network Structure:</a:t>
+                </a:r>
+              </a:p>
+              <a:p>
+                <a:pPr marL="342900" lvl="0" algn="l" rtl="0">
+                  <a:spcBef>
+                    <a:spcPts val="1200"/>
+                  </a:spcBef>
+                  <a:spcAft>
+                    <a:spcPts val="0"/>
+                  </a:spcAft>
+                  <a:buAutoNum type="arabicPeriod"/>
+                </a:pPr>
+                <a:r>
+                  <a:rPr lang="en-US" sz="1400" dirty="0">
+                    <a:solidFill>
+                      <a:schemeClr val="tx1"/>
+                    </a:solidFill>
+                  </a:rPr>
+                  <a:t>Frame stacking Convolution:</a:t>
+                </a:r>
+              </a:p>
+              <a:p>
+                <a:pPr marL="800100" lvl="1">
+                  <a:spcBef>
+                    <a:spcPts val="1200"/>
+                  </a:spcBef>
+                  <a:buAutoNum type="arabicPeriod"/>
+                </a:pPr>
+                <a:r>
+                  <a:rPr lang="en-US" dirty="0">
+                    <a:solidFill>
+                      <a:schemeClr val="tx1"/>
+                    </a:solidFill>
+                  </a:rPr>
+                  <a:t>Change input of 1 image to 4 image stacked together, and use Feed Forward Structures</a:t>
+                </a:r>
+              </a:p>
+              <a:p>
+                <a:pPr marL="800100" lvl="1">
+                  <a:spcBef>
+                    <a:spcPts val="1200"/>
+                  </a:spcBef>
+                  <a:buAutoNum type="arabicPeriod"/>
+                </a:pPr>
+                <a:r>
+                  <a:rPr lang="en-US" dirty="0">
+                    <a:solidFill>
+                      <a:schemeClr val="tx1"/>
+                    </a:solidFill>
+                  </a:rPr>
+                  <a:t>Still partially observable (lose of earlier information, but should be enough for </a:t>
+                </a:r>
+                <a:r>
+                  <a:rPr lang="en-US" dirty="0" err="1">
+                    <a:solidFill>
+                      <a:schemeClr val="tx1"/>
+                    </a:solidFill>
+                  </a:rPr>
+                  <a:t>seaquest</a:t>
+                </a:r>
+                <a:r>
+                  <a:rPr lang="en-US" dirty="0">
+                    <a:solidFill>
+                      <a:schemeClr val="tx1"/>
+                    </a:solidFill>
+                  </a:rPr>
+                  <a:t>)</a:t>
+                </a:r>
+              </a:p>
+              <a:p>
+                <a:pPr marL="342900">
+                  <a:spcBef>
+                    <a:spcPts val="1200"/>
+                  </a:spcBef>
+                  <a:buAutoNum type="arabicPeriod"/>
+                </a:pPr>
+                <a:r>
+                  <a:rPr lang="en-US" sz="1400" dirty="0">
+                    <a:solidFill>
+                      <a:schemeClr val="tx1"/>
+                    </a:solidFill>
+                  </a:rPr>
+                  <a:t>Convolutional RNNs:</a:t>
+                </a:r>
+              </a:p>
+              <a:p>
+                <a:pPr marL="800100" lvl="1">
+                  <a:spcBef>
+                    <a:spcPts val="1200"/>
+                  </a:spcBef>
+                  <a:buAutoNum type="arabicPeriod"/>
+                </a:pPr>
+                <a:r>
+                  <a:rPr lang="en-US" dirty="0">
+                    <a:solidFill>
+                      <a:schemeClr val="tx1"/>
+                    </a:solidFill>
+                  </a:rPr>
+                  <a:t>belief of state as model hidden state, belief conditioned action distribution </a:t>
+                </a:r>
+                <a14:m>
+                  <m:oMath xmlns:m="http://schemas.openxmlformats.org/officeDocument/2006/math">
+                    <m:r>
+                      <a:rPr lang="en-US" b="0" i="1" smtClean="0">
+                        <a:solidFill>
+                          <a:schemeClr val="tx1"/>
+                        </a:solidFill>
+                        <a:latin typeface="Cambria Math" panose="02040503050406030204" pitchFamily="18" charset="0"/>
+                      </a:rPr>
+                      <m:t>𝜋</m:t>
+                    </m:r>
+                    <m:r>
+                      <a:rPr lang="en-US" b="0" i="1" smtClean="0">
+                        <a:solidFill>
+                          <a:schemeClr val="tx1"/>
+                        </a:solidFill>
+                        <a:latin typeface="Cambria Math" panose="02040503050406030204" pitchFamily="18" charset="0"/>
+                      </a:rPr>
+                      <m:t>(</m:t>
+                    </m:r>
+                    <m:r>
+                      <a:rPr lang="en-US" b="0" i="1" smtClean="0">
+                        <a:solidFill>
+                          <a:schemeClr val="tx1"/>
+                        </a:solidFill>
+                        <a:latin typeface="Cambria Math" panose="02040503050406030204" pitchFamily="18" charset="0"/>
+                      </a:rPr>
+                      <m:t>𝑎</m:t>
+                    </m:r>
+                    <m:r>
+                      <a:rPr lang="en-US" b="0" i="1" smtClean="0">
+                        <a:solidFill>
+                          <a:schemeClr val="tx1"/>
+                        </a:solidFill>
+                        <a:latin typeface="Cambria Math" panose="02040503050406030204" pitchFamily="18" charset="0"/>
+                      </a:rPr>
+                      <m:t>|</m:t>
+                    </m:r>
+                    <m:r>
+                      <a:rPr lang="en-US" b="0" i="1" smtClean="0">
+                        <a:solidFill>
+                          <a:schemeClr val="tx1"/>
+                        </a:solidFill>
+                        <a:latin typeface="Cambria Math" panose="02040503050406030204" pitchFamily="18" charset="0"/>
+                      </a:rPr>
+                      <m:t>h</m:t>
+                    </m:r>
+                    <m:r>
+                      <a:rPr lang="en-US" b="0" i="1" smtClean="0">
+                        <a:solidFill>
+                          <a:schemeClr val="tx1"/>
+                        </a:solidFill>
+                        <a:latin typeface="Cambria Math" panose="02040503050406030204" pitchFamily="18" charset="0"/>
+                      </a:rPr>
+                      <m:t>)</m:t>
+                    </m:r>
+                  </m:oMath>
+                </a14:m>
+                <a:endParaRPr lang="en-US" dirty="0">
+                  <a:solidFill>
+                    <a:schemeClr val="tx1"/>
+                  </a:solidFill>
+                </a:endParaRPr>
+              </a:p>
+              <a:p>
+                <a:pPr marL="800100" lvl="1">
+                  <a:spcBef>
+                    <a:spcPts val="1200"/>
+                  </a:spcBef>
+                  <a:buAutoNum type="arabicPeriod"/>
+                </a:pPr>
+                <a:r>
+                  <a:rPr lang="en-US" dirty="0">
+                    <a:solidFill>
+                      <a:schemeClr val="tx1"/>
+                    </a:solidFill>
+                  </a:rPr>
+                  <a:t>memory consuming, vanishing gradients</a:t>
+                </a:r>
+              </a:p>
+              <a:p>
+                <a:endParaRPr lang="en-US" sz="1400" dirty="0"/>
+              </a:p>
+            </p:txBody>
+          </p:sp>
+        </mc:Choice>
+        <mc:Fallback>
+          <p:sp>
+            <p:nvSpPr>
+              <p:cNvPr id="3" name="Text Placeholder 2">
+                <a:extLst>
+                  <a:ext uri="{FF2B5EF4-FFF2-40B4-BE49-F238E27FC236}">
+                    <a16:creationId xmlns:a16="http://schemas.microsoft.com/office/drawing/2014/main" id="{6CCC3D13-19FE-4617-A199-6A62AC33AFFF}"/>
+                  </a:ext>
+                </a:extLst>
+              </p:cNvPr>
+              <p:cNvSpPr>
+                <a:spLocks noGrp="1" noRot="1" noChangeAspect="1" noMove="1" noResize="1" noEditPoints="1" noAdjustHandles="1" noChangeArrowheads="1" noChangeShapeType="1" noTextEdit="1"/>
+              </p:cNvSpPr>
+              <p:nvPr>
+                <p:ph type="body" idx="1"/>
+              </p:nvPr>
+            </p:nvSpPr>
+            <p:spPr>
+              <a:blipFill>
+                <a:blip r:embed="rId2"/>
+                <a:stretch>
+                  <a:fillRect l="-429"/>
+                </a:stretch>
+              </a:blipFill>
+            </p:spPr>
+            <p:txBody>
+              <a:bodyPr/>
+              <a:lstStyle/>
+              <a:p>
+                <a:r>
+                  <a:rPr lang="en-US">
+                    <a:noFill/>
+                  </a:rPr>
+                  <a:t> </a:t>
+                </a:r>
+              </a:p>
+            </p:txBody>
+          </p:sp>
+        </mc:Fallback>
+      </mc:AlternateContent>
+      <p:pic>
+        <p:nvPicPr>
+          <p:cNvPr id="5" name="Picture 4">
             <a:extLst>
               <a:ext uri="{FF2B5EF4-FFF2-40B4-BE49-F238E27FC236}">
-                <a16:creationId xmlns:a16="http://schemas.microsoft.com/office/drawing/2014/main" id="{6CCC3D13-19FE-4617-A199-6A62AC33AFFF}"/>
+                <a16:creationId xmlns:a16="http://schemas.microsoft.com/office/drawing/2014/main" id="{8399623F-C138-4C5A-A3D5-F72ADFFC96E9}"/>
               </a:ext>
             </a:extLst>
           </p:cNvPr>
-          <p:cNvSpPr>
-            <a:spLocks noGrp="1"/>
-          </p:cNvSpPr>
-          <p:nvPr>
-            <p:ph type="body" idx="1"/>
-          </p:nvPr>
-        </p:nvSpPr>
-        <p:spPr/>
-        <p:txBody>
-          <a:bodyPr>
-            <a:normAutofit fontScale="92500" lnSpcReduction="20000"/>
-          </a:bodyPr>
-          <a:lstStyle/>
-          <a:p>
-            <a:pPr marL="0" lvl="0" indent="0" algn="l" rtl="0">
-              <a:spcBef>
-                <a:spcPts val="1200"/>
-              </a:spcBef>
-              <a:spcAft>
-                <a:spcPts val="0"/>
-              </a:spcAft>
-              <a:buNone/>
-            </a:pPr>
-            <a:r>
-              <a:rPr lang="en-US" dirty="0">
-                <a:solidFill>
-                  <a:schemeClr val="tx1"/>
-                </a:solidFill>
-              </a:rPr>
-              <a:t>Solutions to Policy Network Structure:</a:t>
-            </a:r>
-          </a:p>
-          <a:p>
-            <a:pPr marL="0" lvl="0" indent="457200" algn="l" rtl="0">
-              <a:spcBef>
-                <a:spcPts val="1200"/>
-              </a:spcBef>
-              <a:spcAft>
-                <a:spcPts val="0"/>
-              </a:spcAft>
-              <a:buNone/>
-            </a:pPr>
-            <a:r>
-              <a:rPr lang="en-US" dirty="0">
-                <a:solidFill>
-                  <a:schemeClr val="tx1"/>
-                </a:solidFill>
-              </a:rPr>
-              <a:t>Frame stacking Convolution:</a:t>
-            </a:r>
-          </a:p>
-          <a:p>
-            <a:pPr marL="0" lvl="0" indent="457200" algn="l" rtl="0">
-              <a:spcBef>
-                <a:spcPts val="1200"/>
-              </a:spcBef>
-              <a:spcAft>
-                <a:spcPts val="0"/>
-              </a:spcAft>
-              <a:buNone/>
-            </a:pPr>
-            <a:r>
-              <a:rPr lang="en-US" dirty="0">
-                <a:solidFill>
-                  <a:schemeClr val="tx1"/>
-                </a:solidFill>
-              </a:rPr>
-              <a:t>	Change input of 1 image to 4 image stacked together, and use Feed Forward Structures</a:t>
-            </a:r>
-          </a:p>
-          <a:p>
-            <a:pPr marL="0" lvl="0" indent="457200" algn="l" rtl="0">
-              <a:spcBef>
-                <a:spcPts val="1200"/>
-              </a:spcBef>
-              <a:spcAft>
-                <a:spcPts val="0"/>
-              </a:spcAft>
-              <a:buNone/>
-            </a:pPr>
-            <a:r>
-              <a:rPr lang="en-US" dirty="0">
-                <a:solidFill>
-                  <a:schemeClr val="tx1"/>
-                </a:solidFill>
-              </a:rPr>
-              <a:t>	Close, but still partially observable (lose of earlier information)</a:t>
-            </a:r>
-          </a:p>
-          <a:p>
-            <a:pPr marL="0" lvl="0" indent="457200" algn="l" rtl="0">
-              <a:spcBef>
-                <a:spcPts val="1200"/>
-              </a:spcBef>
-              <a:spcAft>
-                <a:spcPts val="0"/>
-              </a:spcAft>
-              <a:buNone/>
-            </a:pPr>
-            <a:r>
-              <a:rPr lang="en-US" dirty="0">
-                <a:solidFill>
-                  <a:schemeClr val="tx1"/>
-                </a:solidFill>
-              </a:rPr>
-              <a:t>Convolutional RNNs:</a:t>
-            </a:r>
-          </a:p>
-          <a:p>
-            <a:pPr marL="0" lvl="0" indent="457200" algn="l" rtl="0">
-              <a:spcBef>
-                <a:spcPts val="1200"/>
-              </a:spcBef>
-              <a:spcAft>
-                <a:spcPts val="0"/>
-              </a:spcAft>
-              <a:buNone/>
-            </a:pPr>
-            <a:r>
-              <a:rPr lang="en-US" dirty="0">
-                <a:solidFill>
-                  <a:schemeClr val="tx1"/>
-                </a:solidFill>
-              </a:rPr>
-              <a:t>	belief of state as model hidden state, belief conditioned action distribution</a:t>
-            </a:r>
-          </a:p>
-          <a:p>
-            <a:pPr marL="0" lvl="0" indent="457200" algn="l" rtl="0">
-              <a:spcBef>
-                <a:spcPts val="1200"/>
-              </a:spcBef>
-              <a:spcAft>
-                <a:spcPts val="1200"/>
-              </a:spcAft>
-              <a:buNone/>
-            </a:pPr>
-            <a:r>
-              <a:rPr lang="en-US" dirty="0">
-                <a:solidFill>
-                  <a:schemeClr val="tx1"/>
-                </a:solidFill>
-              </a:rPr>
-              <a:t>	memory consuming, vanishing gradients</a:t>
-            </a:r>
-          </a:p>
-          <a:p>
-            <a:endParaRPr lang="en-US" dirty="0"/>
-          </a:p>
-        </p:txBody>
-      </p:sp>
+          <p:cNvPicPr>
+            <a:picLocks noChangeAspect="1"/>
+          </p:cNvPicPr>
+          <p:nvPr/>
+        </p:nvPicPr>
+        <p:blipFill>
+          <a:blip r:embed="rId3"/>
+          <a:stretch>
+            <a:fillRect/>
+          </a:stretch>
+        </p:blipFill>
+        <p:spPr>
+          <a:xfrm>
+            <a:off x="3694989" y="1017725"/>
+            <a:ext cx="2268371" cy="1166361"/>
+          </a:xfrm>
+          <a:prstGeom prst="rect">
+            <a:avLst/>
+          </a:prstGeom>
+        </p:spPr>
+      </p:pic>
     </p:spTree>
     <p:extLst>
       <p:ext uri="{BB962C8B-B14F-4D97-AF65-F5344CB8AC3E}">
@@ -15755,64 +17548,884 @@
           </a:p>
         </p:txBody>
       </p:sp>
-      <p:sp>
-        <p:nvSpPr>
-          <p:cNvPr id="103" name="Google Shape;103;p21"/>
-          <p:cNvSpPr txBox="1">
-            <a:spLocks noGrp="1"/>
-          </p:cNvSpPr>
-          <p:nvPr>
-            <p:ph type="body" idx="1"/>
-          </p:nvPr>
-        </p:nvSpPr>
+      <mc:AlternateContent xmlns:mc="http://schemas.openxmlformats.org/markup-compatibility/2006" xmlns:a14="http://schemas.microsoft.com/office/drawing/2010/main">
+        <mc:Choice Requires="a14">
+          <p:sp>
+            <p:nvSpPr>
+              <p:cNvPr id="103" name="Google Shape;103;p21"/>
+              <p:cNvSpPr txBox="1">
+                <a:spLocks noGrp="1"/>
+              </p:cNvSpPr>
+              <p:nvPr>
+                <p:ph type="body" idx="1"/>
+              </p:nvPr>
+            </p:nvSpPr>
+            <p:spPr>
+              <a:xfrm>
+                <a:off x="311700" y="1152475"/>
+                <a:ext cx="4260300" cy="3416400"/>
+              </a:xfrm>
+              <a:prstGeom prst="rect">
+                <a:avLst/>
+              </a:prstGeom>
+            </p:spPr>
+            <p:txBody>
+              <a:bodyPr spcFirstLastPara="1" wrap="square" lIns="91425" tIns="91425" rIns="91425" bIns="91425" anchor="t" anchorCtr="0">
+                <a:normAutofit/>
+              </a:bodyPr>
+              <a:lstStyle/>
+              <a:p>
+                <a:pPr marL="0" lvl="0" indent="0" algn="l" rtl="0">
+                  <a:spcBef>
+                    <a:spcPts val="0"/>
+                  </a:spcBef>
+                  <a:spcAft>
+                    <a:spcPts val="0"/>
+                  </a:spcAft>
+                  <a:buNone/>
+                </a:pPr>
+                <a:r>
+                  <a:rPr lang="en" sz="1400" dirty="0">
+                    <a:solidFill>
+                      <a:schemeClr val="tx1"/>
+                    </a:solidFill>
+                  </a:rPr>
+                  <a:t>Feed Forward</a:t>
+                </a:r>
+              </a:p>
+              <a:p>
+                <a:pPr marL="0" lvl="0" indent="0" algn="l" rtl="0">
+                  <a:spcBef>
+                    <a:spcPts val="0"/>
+                  </a:spcBef>
+                  <a:spcAft>
+                    <a:spcPts val="0"/>
+                  </a:spcAft>
+                  <a:buNone/>
+                </a:pPr>
+                <a:endParaRPr lang="en" sz="1400" dirty="0">
+                  <a:solidFill>
+                    <a:schemeClr val="tx1"/>
+                  </a:solidFill>
+                </a:endParaRPr>
+              </a:p>
+              <a:p>
+                <a:pPr marL="0" lvl="0" indent="0" algn="l" rtl="0">
+                  <a:spcBef>
+                    <a:spcPts val="0"/>
+                  </a:spcBef>
+                  <a:spcAft>
+                    <a:spcPts val="0"/>
+                  </a:spcAft>
+                  <a:buNone/>
+                </a:pPr>
+                <a:endParaRPr lang="en" sz="1400" dirty="0">
+                  <a:solidFill>
+                    <a:schemeClr val="tx1"/>
+                  </a:solidFill>
+                </a:endParaRPr>
+              </a:p>
+              <a:p>
+                <a:pPr marL="0" lvl="0" indent="0" algn="l" rtl="0">
+                  <a:spcBef>
+                    <a:spcPts val="0"/>
+                  </a:spcBef>
+                  <a:spcAft>
+                    <a:spcPts val="0"/>
+                  </a:spcAft>
+                  <a:buNone/>
+                </a:pPr>
+                <a:endParaRPr lang="en" sz="1400" dirty="0">
+                  <a:solidFill>
+                    <a:schemeClr val="tx1"/>
+                  </a:solidFill>
+                </a:endParaRPr>
+              </a:p>
+              <a:p>
+                <a:pPr marL="0" lvl="0" indent="0" algn="l" rtl="0">
+                  <a:spcBef>
+                    <a:spcPts val="0"/>
+                  </a:spcBef>
+                  <a:spcAft>
+                    <a:spcPts val="0"/>
+                  </a:spcAft>
+                  <a:buNone/>
+                </a:pPr>
+                <a:endParaRPr lang="en" sz="1400" dirty="0">
+                  <a:solidFill>
+                    <a:schemeClr val="tx1"/>
+                  </a:solidFill>
+                </a:endParaRPr>
+              </a:p>
+              <a:p>
+                <a:pPr marL="0" lvl="0" indent="0" algn="l" rtl="0">
+                  <a:spcBef>
+                    <a:spcPts val="0"/>
+                  </a:spcBef>
+                  <a:spcAft>
+                    <a:spcPts val="0"/>
+                  </a:spcAft>
+                  <a:buNone/>
+                </a:pPr>
+                <a:endParaRPr lang="en" sz="1400" dirty="0">
+                  <a:solidFill>
+                    <a:schemeClr val="tx1"/>
+                  </a:solidFill>
+                </a:endParaRPr>
+              </a:p>
+              <a:p>
+                <a:pPr marL="0" lvl="0" indent="0" algn="l" rtl="0">
+                  <a:spcBef>
+                    <a:spcPts val="0"/>
+                  </a:spcBef>
+                  <a:spcAft>
+                    <a:spcPts val="0"/>
+                  </a:spcAft>
+                  <a:buNone/>
+                </a:pPr>
+                <a:endParaRPr lang="en" sz="1400" dirty="0">
+                  <a:solidFill>
+                    <a:schemeClr val="tx1"/>
+                  </a:solidFill>
+                </a:endParaRPr>
+              </a:p>
+              <a:p>
+                <a:pPr marL="0" lvl="0" indent="0" algn="l" rtl="0">
+                  <a:spcBef>
+                    <a:spcPts val="0"/>
+                  </a:spcBef>
+                  <a:spcAft>
+                    <a:spcPts val="0"/>
+                  </a:spcAft>
+                  <a:buNone/>
+                </a:pPr>
+                <a:endParaRPr lang="en" sz="1400" dirty="0">
+                  <a:solidFill>
+                    <a:schemeClr val="tx1"/>
+                  </a:solidFill>
+                </a:endParaRPr>
+              </a:p>
+              <a:p>
+                <a:pPr marL="0" lvl="0" indent="0" algn="l" rtl="0">
+                  <a:spcBef>
+                    <a:spcPts val="0"/>
+                  </a:spcBef>
+                  <a:spcAft>
+                    <a:spcPts val="0"/>
+                  </a:spcAft>
+                  <a:buNone/>
+                </a:pPr>
+                <a:endParaRPr lang="en" sz="1400" dirty="0">
+                  <a:solidFill>
+                    <a:schemeClr val="tx1"/>
+                  </a:solidFill>
+                </a:endParaRPr>
+              </a:p>
+              <a:p>
+                <a:pPr marL="0" lvl="0" indent="0" algn="l" rtl="0">
+                  <a:spcBef>
+                    <a:spcPts val="0"/>
+                  </a:spcBef>
+                  <a:spcAft>
+                    <a:spcPts val="0"/>
+                  </a:spcAft>
+                  <a:buNone/>
+                </a:pPr>
+                <a:endParaRPr lang="en" sz="1400" dirty="0">
+                  <a:solidFill>
+                    <a:schemeClr val="tx1"/>
+                  </a:solidFill>
+                </a:endParaRPr>
+              </a:p>
+              <a:p>
+                <a:pPr marL="0" lvl="0" indent="0" algn="l" rtl="0">
+                  <a:spcBef>
+                    <a:spcPts val="0"/>
+                  </a:spcBef>
+                  <a:spcAft>
+                    <a:spcPts val="0"/>
+                  </a:spcAft>
+                  <a:buNone/>
+                </a:pPr>
+                <a:endParaRPr lang="en" sz="1400" dirty="0">
+                  <a:solidFill>
+                    <a:schemeClr val="tx1"/>
+                  </a:solidFill>
+                </a:endParaRPr>
+              </a:p>
+              <a:p>
+                <a:pPr marL="0" indent="0">
+                  <a:buNone/>
+                </a:pPr>
+                <a:r>
+                  <a:rPr lang="en-US" sz="1400" b="0" dirty="0">
+                    <a:solidFill>
+                      <a:schemeClr val="tx1"/>
+                    </a:solidFill>
+                  </a:rPr>
+                  <a:t>Assume 4 stacked image </a:t>
+                </a:r>
+                <a14:m>
+                  <m:oMath xmlns:m="http://schemas.openxmlformats.org/officeDocument/2006/math">
+                    <m:r>
+                      <a:rPr lang="en-US" sz="1400" b="0" i="1" smtClean="0">
+                        <a:solidFill>
+                          <a:schemeClr val="tx1"/>
+                        </a:solidFill>
+                        <a:latin typeface="Cambria Math" panose="02040503050406030204" pitchFamily="18" charset="0"/>
+                      </a:rPr>
+                      <m:t>𝑠</m:t>
+                    </m:r>
+                  </m:oMath>
+                </a14:m>
+                <a:r>
+                  <a:rPr lang="en-US" sz="1400" dirty="0">
+                    <a:solidFill>
+                      <a:schemeClr val="tx1"/>
+                    </a:solidFill>
+                  </a:rPr>
+                  <a:t> is Markov</a:t>
+                </a:r>
+                <a:endParaRPr lang="en" sz="1400" dirty="0">
+                  <a:solidFill>
+                    <a:schemeClr val="tx1"/>
+                  </a:solidFill>
+                </a:endParaRPr>
+              </a:p>
+              <a:p>
+                <a:pPr marL="0" indent="0">
+                  <a:buNone/>
+                </a:pPr>
+                <a:r>
+                  <a:rPr lang="en-US" sz="1400" dirty="0">
+                    <a:solidFill>
+                      <a:schemeClr val="tx1"/>
+                    </a:solidFill>
+                  </a:rPr>
+                  <a:t>Neural Network as state conditioned policy</a:t>
+                </a:r>
+                <a:endParaRPr lang="en" sz="1400" dirty="0">
+                  <a:solidFill>
+                    <a:schemeClr val="tx1"/>
+                  </a:solidFill>
+                </a:endParaRPr>
+              </a:p>
+              <a:p>
+                <a:pPr marL="0" lvl="0" indent="0" algn="l" rtl="0">
+                  <a:spcBef>
+                    <a:spcPts val="0"/>
+                  </a:spcBef>
+                  <a:spcAft>
+                    <a:spcPts val="0"/>
+                  </a:spcAft>
+                  <a:buNone/>
+                </a:pPr>
+                <a:endParaRPr sz="1400" dirty="0">
+                  <a:solidFill>
+                    <a:schemeClr val="tx1"/>
+                  </a:solidFill>
+                </a:endParaRPr>
+              </a:p>
+            </p:txBody>
+          </p:sp>
+        </mc:Choice>
+        <mc:Fallback xmlns="">
+          <p:sp>
+            <p:nvSpPr>
+              <p:cNvPr id="103" name="Google Shape;103;p21"/>
+              <p:cNvSpPr txBox="1">
+                <a:spLocks noGrp="1" noRot="1" noChangeAspect="1" noMove="1" noResize="1" noEditPoints="1" noAdjustHandles="1" noChangeArrowheads="1" noChangeShapeType="1" noTextEdit="1"/>
+              </p:cNvSpPr>
+              <p:nvPr>
+                <p:ph type="body" idx="1"/>
+              </p:nvPr>
+            </p:nvSpPr>
+            <p:spPr>
+              <a:xfrm>
+                <a:off x="311700" y="1152475"/>
+                <a:ext cx="4260300" cy="3416400"/>
+              </a:xfrm>
+              <a:prstGeom prst="rect">
+                <a:avLst/>
+              </a:prstGeom>
+              <a:blipFill>
+                <a:blip r:embed="rId3"/>
+                <a:stretch>
+                  <a:fillRect l="-429"/>
+                </a:stretch>
+              </a:blipFill>
+            </p:spPr>
+            <p:txBody>
+              <a:bodyPr/>
+              <a:lstStyle/>
+              <a:p>
+                <a:r>
+                  <a:rPr lang="en-US">
+                    <a:noFill/>
+                  </a:rPr>
+                  <a:t> </a:t>
+                </a:r>
+              </a:p>
+            </p:txBody>
+          </p:sp>
+        </mc:Fallback>
+      </mc:AlternateContent>
+      <mc:AlternateContent xmlns:mc="http://schemas.openxmlformats.org/markup-compatibility/2006" xmlns:a14="http://schemas.microsoft.com/office/drawing/2010/main">
+        <mc:Choice Requires="a14">
+          <p:sp>
+            <p:nvSpPr>
+              <p:cNvPr id="4" name="Google Shape;103;p21">
+                <a:extLst>
+                  <a:ext uri="{FF2B5EF4-FFF2-40B4-BE49-F238E27FC236}">
+                    <a16:creationId xmlns:a16="http://schemas.microsoft.com/office/drawing/2014/main" id="{33CF637F-451E-4635-B101-D560728AF7F8}"/>
+                  </a:ext>
+                </a:extLst>
+              </p:cNvPr>
+              <p:cNvSpPr txBox="1">
+                <a:spLocks/>
+              </p:cNvSpPr>
+              <p:nvPr/>
+            </p:nvSpPr>
+            <p:spPr>
+              <a:xfrm>
+                <a:off x="4572000" y="1152475"/>
+                <a:ext cx="4260300" cy="3416400"/>
+              </a:xfrm>
+              <a:prstGeom prst="rect">
+                <a:avLst/>
+              </a:prstGeom>
+              <a:noFill/>
+              <a:ln>
+                <a:noFill/>
+              </a:ln>
+            </p:spPr>
+            <p:txBody>
+              <a:bodyPr spcFirstLastPara="1" wrap="square" lIns="91425" tIns="91425" rIns="91425" bIns="91425" anchor="t" anchorCtr="0">
+                <a:normAutofit/>
+              </a:bodyPr>
+              <a:lstStyle>
+                <a:defPPr marR="0" lvl="0" algn="l" rtl="0">
+                  <a:lnSpc>
+                    <a:spcPct val="100000"/>
+                  </a:lnSpc>
+                  <a:spcBef>
+                    <a:spcPts val="0"/>
+                  </a:spcBef>
+                  <a:spcAft>
+                    <a:spcPts val="0"/>
+                  </a:spcAft>
+                </a:defPPr>
+                <a:lvl1pPr marL="457200" marR="0" lvl="0" indent="-342900" algn="l" rtl="0">
+                  <a:lnSpc>
+                    <a:spcPct val="115000"/>
+                  </a:lnSpc>
+                  <a:spcBef>
+                    <a:spcPts val="0"/>
+                  </a:spcBef>
+                  <a:spcAft>
+                    <a:spcPts val="0"/>
+                  </a:spcAft>
+                  <a:buClr>
+                    <a:schemeClr val="dk2"/>
+                  </a:buClr>
+                  <a:buSzPts val="1800"/>
+                  <a:buFont typeface="Arial"/>
+                  <a:buChar char="●"/>
+                  <a:defRPr sz="1800" b="0" i="0" u="none" strike="noStrike" cap="none">
+                    <a:solidFill>
+                      <a:schemeClr val="dk2"/>
+                    </a:solidFill>
+                    <a:latin typeface="Arial"/>
+                    <a:ea typeface="Arial"/>
+                    <a:cs typeface="Arial"/>
+                    <a:sym typeface="Arial"/>
+                  </a:defRPr>
+                </a:lvl1pPr>
+                <a:lvl2pPr marL="914400" marR="0" lvl="1" indent="-317500" algn="l" rtl="0">
+                  <a:lnSpc>
+                    <a:spcPct val="115000"/>
+                  </a:lnSpc>
+                  <a:spcBef>
+                    <a:spcPts val="0"/>
+                  </a:spcBef>
+                  <a:spcAft>
+                    <a:spcPts val="0"/>
+                  </a:spcAft>
+                  <a:buClr>
+                    <a:schemeClr val="dk2"/>
+                  </a:buClr>
+                  <a:buSzPts val="1400"/>
+                  <a:buFont typeface="Arial"/>
+                  <a:buChar char="○"/>
+                  <a:defRPr sz="1400" b="0" i="0" u="none" strike="noStrike" cap="none">
+                    <a:solidFill>
+                      <a:schemeClr val="dk2"/>
+                    </a:solidFill>
+                    <a:latin typeface="Arial"/>
+                    <a:ea typeface="Arial"/>
+                    <a:cs typeface="Arial"/>
+                    <a:sym typeface="Arial"/>
+                  </a:defRPr>
+                </a:lvl2pPr>
+                <a:lvl3pPr marL="1371600" marR="0" lvl="2" indent="-317500" algn="l" rtl="0">
+                  <a:lnSpc>
+                    <a:spcPct val="115000"/>
+                  </a:lnSpc>
+                  <a:spcBef>
+                    <a:spcPts val="0"/>
+                  </a:spcBef>
+                  <a:spcAft>
+                    <a:spcPts val="0"/>
+                  </a:spcAft>
+                  <a:buClr>
+                    <a:schemeClr val="dk2"/>
+                  </a:buClr>
+                  <a:buSzPts val="1400"/>
+                  <a:buFont typeface="Arial"/>
+                  <a:buChar char="■"/>
+                  <a:defRPr sz="1400" b="0" i="0" u="none" strike="noStrike" cap="none">
+                    <a:solidFill>
+                      <a:schemeClr val="dk2"/>
+                    </a:solidFill>
+                    <a:latin typeface="Arial"/>
+                    <a:ea typeface="Arial"/>
+                    <a:cs typeface="Arial"/>
+                    <a:sym typeface="Arial"/>
+                  </a:defRPr>
+                </a:lvl3pPr>
+                <a:lvl4pPr marL="1828800" marR="0" lvl="3" indent="-317500" algn="l" rtl="0">
+                  <a:lnSpc>
+                    <a:spcPct val="115000"/>
+                  </a:lnSpc>
+                  <a:spcBef>
+                    <a:spcPts val="0"/>
+                  </a:spcBef>
+                  <a:spcAft>
+                    <a:spcPts val="0"/>
+                  </a:spcAft>
+                  <a:buClr>
+                    <a:schemeClr val="dk2"/>
+                  </a:buClr>
+                  <a:buSzPts val="1400"/>
+                  <a:buFont typeface="Arial"/>
+                  <a:buChar char="●"/>
+                  <a:defRPr sz="1400" b="0" i="0" u="none" strike="noStrike" cap="none">
+                    <a:solidFill>
+                      <a:schemeClr val="dk2"/>
+                    </a:solidFill>
+                    <a:latin typeface="Arial"/>
+                    <a:ea typeface="Arial"/>
+                    <a:cs typeface="Arial"/>
+                    <a:sym typeface="Arial"/>
+                  </a:defRPr>
+                </a:lvl4pPr>
+                <a:lvl5pPr marL="2286000" marR="0" lvl="4" indent="-317500" algn="l" rtl="0">
+                  <a:lnSpc>
+                    <a:spcPct val="115000"/>
+                  </a:lnSpc>
+                  <a:spcBef>
+                    <a:spcPts val="0"/>
+                  </a:spcBef>
+                  <a:spcAft>
+                    <a:spcPts val="0"/>
+                  </a:spcAft>
+                  <a:buClr>
+                    <a:schemeClr val="dk2"/>
+                  </a:buClr>
+                  <a:buSzPts val="1400"/>
+                  <a:buFont typeface="Arial"/>
+                  <a:buChar char="○"/>
+                  <a:defRPr sz="1400" b="0" i="0" u="none" strike="noStrike" cap="none">
+                    <a:solidFill>
+                      <a:schemeClr val="dk2"/>
+                    </a:solidFill>
+                    <a:latin typeface="Arial"/>
+                    <a:ea typeface="Arial"/>
+                    <a:cs typeface="Arial"/>
+                    <a:sym typeface="Arial"/>
+                  </a:defRPr>
+                </a:lvl5pPr>
+                <a:lvl6pPr marL="2743200" marR="0" lvl="5" indent="-317500" algn="l" rtl="0">
+                  <a:lnSpc>
+                    <a:spcPct val="115000"/>
+                  </a:lnSpc>
+                  <a:spcBef>
+                    <a:spcPts val="0"/>
+                  </a:spcBef>
+                  <a:spcAft>
+                    <a:spcPts val="0"/>
+                  </a:spcAft>
+                  <a:buClr>
+                    <a:schemeClr val="dk2"/>
+                  </a:buClr>
+                  <a:buSzPts val="1400"/>
+                  <a:buFont typeface="Arial"/>
+                  <a:buChar char="■"/>
+                  <a:defRPr sz="1400" b="0" i="0" u="none" strike="noStrike" cap="none">
+                    <a:solidFill>
+                      <a:schemeClr val="dk2"/>
+                    </a:solidFill>
+                    <a:latin typeface="Arial"/>
+                    <a:ea typeface="Arial"/>
+                    <a:cs typeface="Arial"/>
+                    <a:sym typeface="Arial"/>
+                  </a:defRPr>
+                </a:lvl6pPr>
+                <a:lvl7pPr marL="3200400" marR="0" lvl="6" indent="-317500" algn="l" rtl="0">
+                  <a:lnSpc>
+                    <a:spcPct val="115000"/>
+                  </a:lnSpc>
+                  <a:spcBef>
+                    <a:spcPts val="0"/>
+                  </a:spcBef>
+                  <a:spcAft>
+                    <a:spcPts val="0"/>
+                  </a:spcAft>
+                  <a:buClr>
+                    <a:schemeClr val="dk2"/>
+                  </a:buClr>
+                  <a:buSzPts val="1400"/>
+                  <a:buFont typeface="Arial"/>
+                  <a:buChar char="●"/>
+                  <a:defRPr sz="1400" b="0" i="0" u="none" strike="noStrike" cap="none">
+                    <a:solidFill>
+                      <a:schemeClr val="dk2"/>
+                    </a:solidFill>
+                    <a:latin typeface="Arial"/>
+                    <a:ea typeface="Arial"/>
+                    <a:cs typeface="Arial"/>
+                    <a:sym typeface="Arial"/>
+                  </a:defRPr>
+                </a:lvl7pPr>
+                <a:lvl8pPr marL="3657600" marR="0" lvl="7" indent="-317500" algn="l" rtl="0">
+                  <a:lnSpc>
+                    <a:spcPct val="115000"/>
+                  </a:lnSpc>
+                  <a:spcBef>
+                    <a:spcPts val="0"/>
+                  </a:spcBef>
+                  <a:spcAft>
+                    <a:spcPts val="0"/>
+                  </a:spcAft>
+                  <a:buClr>
+                    <a:schemeClr val="dk2"/>
+                  </a:buClr>
+                  <a:buSzPts val="1400"/>
+                  <a:buFont typeface="Arial"/>
+                  <a:buChar char="○"/>
+                  <a:defRPr sz="1400" b="0" i="0" u="none" strike="noStrike" cap="none">
+                    <a:solidFill>
+                      <a:schemeClr val="dk2"/>
+                    </a:solidFill>
+                    <a:latin typeface="Arial"/>
+                    <a:ea typeface="Arial"/>
+                    <a:cs typeface="Arial"/>
+                    <a:sym typeface="Arial"/>
+                  </a:defRPr>
+                </a:lvl8pPr>
+                <a:lvl9pPr marL="4114800" marR="0" lvl="8" indent="-317500" algn="l" rtl="0">
+                  <a:lnSpc>
+                    <a:spcPct val="115000"/>
+                  </a:lnSpc>
+                  <a:spcBef>
+                    <a:spcPts val="0"/>
+                  </a:spcBef>
+                  <a:spcAft>
+                    <a:spcPts val="0"/>
+                  </a:spcAft>
+                  <a:buClr>
+                    <a:schemeClr val="dk2"/>
+                  </a:buClr>
+                  <a:buSzPts val="1400"/>
+                  <a:buFont typeface="Arial"/>
+                  <a:buChar char="■"/>
+                  <a:defRPr sz="1400" b="0" i="0" u="none" strike="noStrike" cap="none">
+                    <a:solidFill>
+                      <a:schemeClr val="dk2"/>
+                    </a:solidFill>
+                    <a:latin typeface="Arial"/>
+                    <a:ea typeface="Arial"/>
+                    <a:cs typeface="Arial"/>
+                    <a:sym typeface="Arial"/>
+                  </a:defRPr>
+                </a:lvl9pPr>
+              </a:lstStyle>
+              <a:p>
+                <a:pPr marL="0" indent="0">
+                  <a:buFont typeface="Arial"/>
+                  <a:buNone/>
+                </a:pPr>
+                <a:r>
+                  <a:rPr lang="en-US" sz="1400" dirty="0">
+                    <a:solidFill>
+                      <a:schemeClr val="tx1"/>
+                    </a:solidFill>
+                  </a:rPr>
+                  <a:t>Recurrent</a:t>
+                </a:r>
+              </a:p>
+              <a:p>
+                <a:pPr marL="0" indent="0">
+                  <a:buFont typeface="Arial"/>
+                  <a:buNone/>
+                </a:pPr>
+                <a:endParaRPr lang="en-US" sz="1400" dirty="0">
+                  <a:solidFill>
+                    <a:schemeClr val="tx1"/>
+                  </a:solidFill>
+                </a:endParaRPr>
+              </a:p>
+              <a:p>
+                <a:pPr marL="0" indent="0">
+                  <a:buFont typeface="Arial"/>
+                  <a:buNone/>
+                </a:pPr>
+                <a:endParaRPr lang="en-US" sz="1400" dirty="0">
+                  <a:solidFill>
+                    <a:schemeClr val="tx1"/>
+                  </a:solidFill>
+                </a:endParaRPr>
+              </a:p>
+              <a:p>
+                <a:pPr marL="0" indent="0">
+                  <a:buFont typeface="Arial"/>
+                  <a:buNone/>
+                </a:pPr>
+                <a:endParaRPr lang="en-US" sz="1400" dirty="0">
+                  <a:solidFill>
+                    <a:schemeClr val="tx1"/>
+                  </a:solidFill>
+                </a:endParaRPr>
+              </a:p>
+              <a:p>
+                <a:pPr marL="0" indent="0">
+                  <a:buFont typeface="Arial"/>
+                  <a:buNone/>
+                </a:pPr>
+                <a:endParaRPr lang="en-US" sz="1400" dirty="0">
+                  <a:solidFill>
+                    <a:schemeClr val="tx1"/>
+                  </a:solidFill>
+                </a:endParaRPr>
+              </a:p>
+              <a:p>
+                <a:pPr marL="0" indent="0">
+                  <a:buFont typeface="Arial"/>
+                  <a:buNone/>
+                </a:pPr>
+                <a:endParaRPr lang="en-US" sz="1400" dirty="0">
+                  <a:solidFill>
+                    <a:schemeClr val="tx1"/>
+                  </a:solidFill>
+                </a:endParaRPr>
+              </a:p>
+              <a:p>
+                <a:pPr marL="0" indent="0">
+                  <a:buFont typeface="Arial"/>
+                  <a:buNone/>
+                </a:pPr>
+                <a:endParaRPr lang="en-US" sz="1400" dirty="0">
+                  <a:solidFill>
+                    <a:schemeClr val="tx1"/>
+                  </a:solidFill>
+                </a:endParaRPr>
+              </a:p>
+              <a:p>
+                <a:pPr marL="0" indent="0">
+                  <a:buFont typeface="Arial"/>
+                  <a:buNone/>
+                </a:pPr>
+                <a:endParaRPr lang="en-US" sz="1400" dirty="0">
+                  <a:solidFill>
+                    <a:schemeClr val="tx1"/>
+                  </a:solidFill>
+                </a:endParaRPr>
+              </a:p>
+              <a:p>
+                <a:pPr marL="0" indent="0">
+                  <a:buFont typeface="Arial"/>
+                  <a:buNone/>
+                </a:pPr>
+                <a:endParaRPr lang="en-US" sz="1400" dirty="0">
+                  <a:solidFill>
+                    <a:schemeClr val="tx1"/>
+                  </a:solidFill>
+                </a:endParaRPr>
+              </a:p>
+              <a:p>
+                <a:pPr marL="0" indent="0">
+                  <a:buFont typeface="Arial"/>
+                  <a:buNone/>
+                </a:pPr>
+                <a:endParaRPr lang="en-US" sz="1400" dirty="0">
+                  <a:solidFill>
+                    <a:schemeClr val="tx1"/>
+                  </a:solidFill>
+                </a:endParaRPr>
+              </a:p>
+              <a:p>
+                <a:pPr marL="0" indent="0">
+                  <a:buFont typeface="Arial"/>
+                  <a:buNone/>
+                </a:pPr>
+                <a:endParaRPr lang="en-US" sz="1400" dirty="0">
+                  <a:solidFill>
+                    <a:schemeClr val="tx1"/>
+                  </a:solidFill>
+                </a:endParaRPr>
+              </a:p>
+              <a:p>
+                <a:pPr marL="0" indent="0">
+                  <a:buFont typeface="Arial"/>
+                  <a:buNone/>
+                </a:pPr>
+                <a14:m>
+                  <m:oMath xmlns:m="http://schemas.openxmlformats.org/officeDocument/2006/math">
+                    <m:r>
+                      <a:rPr lang="en-US" sz="1400" b="0" i="1" smtClean="0">
+                        <a:solidFill>
+                          <a:schemeClr val="tx1"/>
+                        </a:solidFill>
+                        <a:latin typeface="Cambria Math" panose="02040503050406030204" pitchFamily="18" charset="0"/>
+                      </a:rPr>
+                      <m:t>h</m:t>
+                    </m:r>
+                  </m:oMath>
+                </a14:m>
+                <a:r>
+                  <a:rPr lang="en-US" sz="1400" dirty="0">
+                    <a:solidFill>
+                      <a:schemeClr val="tx1"/>
+                    </a:solidFill>
+                  </a:rPr>
+                  <a:t> as a belief of actual state distribution</a:t>
+                </a:r>
+              </a:p>
+              <a:p>
+                <a:pPr marL="0" indent="0">
+                  <a:buFont typeface="Arial"/>
+                  <a:buNone/>
+                </a:pPr>
+                <a:r>
+                  <a:rPr lang="en-US" sz="1400" dirty="0">
+                    <a:solidFill>
+                      <a:schemeClr val="tx1"/>
+                    </a:solidFill>
+                  </a:rPr>
+                  <a:t>Neural Network as belief conditioned policy</a:t>
+                </a:r>
+              </a:p>
+            </p:txBody>
+          </p:sp>
+        </mc:Choice>
+        <mc:Fallback xmlns="">
+          <p:sp>
+            <p:nvSpPr>
+              <p:cNvPr id="4" name="Google Shape;103;p21">
+                <a:extLst>
+                  <a:ext uri="{FF2B5EF4-FFF2-40B4-BE49-F238E27FC236}">
+                    <a16:creationId xmlns:a16="http://schemas.microsoft.com/office/drawing/2014/main" id="{33CF637F-451E-4635-B101-D560728AF7F8}"/>
+                  </a:ext>
+                </a:extLst>
+              </p:cNvPr>
+              <p:cNvSpPr txBox="1">
+                <a:spLocks noRot="1" noChangeAspect="1" noMove="1" noResize="1" noEditPoints="1" noAdjustHandles="1" noChangeArrowheads="1" noChangeShapeType="1" noTextEdit="1"/>
+              </p:cNvSpPr>
+              <p:nvPr/>
+            </p:nvSpPr>
+            <p:spPr>
+              <a:xfrm>
+                <a:off x="4572000" y="1152475"/>
+                <a:ext cx="4260300" cy="3416400"/>
+              </a:xfrm>
+              <a:prstGeom prst="rect">
+                <a:avLst/>
+              </a:prstGeom>
+              <a:blipFill>
+                <a:blip r:embed="rId4"/>
+                <a:stretch>
+                  <a:fillRect l="-429"/>
+                </a:stretch>
+              </a:blipFill>
+              <a:ln>
+                <a:noFill/>
+              </a:ln>
+            </p:spPr>
+            <p:txBody>
+              <a:bodyPr/>
+              <a:lstStyle/>
+              <a:p>
+                <a:r>
+                  <a:rPr lang="en-US">
+                    <a:noFill/>
+                  </a:rPr>
+                  <a:t> </a:t>
+                </a:r>
+              </a:p>
+            </p:txBody>
+          </p:sp>
+        </mc:Fallback>
+      </mc:AlternateContent>
+      <p:pic>
+        <p:nvPicPr>
+          <p:cNvPr id="3" name="Picture 2">
+            <a:extLst>
+              <a:ext uri="{FF2B5EF4-FFF2-40B4-BE49-F238E27FC236}">
+                <a16:creationId xmlns:a16="http://schemas.microsoft.com/office/drawing/2014/main" id="{E112218E-4D03-4735-AE85-5CF3D0E128EE}"/>
+              </a:ext>
+            </a:extLst>
+          </p:cNvPr>
+          <p:cNvPicPr>
+            <a:picLocks noChangeAspect="1"/>
+          </p:cNvPicPr>
+          <p:nvPr/>
+        </p:nvPicPr>
+        <p:blipFill>
+          <a:blip r:embed="rId5"/>
+          <a:stretch>
+            <a:fillRect/>
+          </a:stretch>
+        </p:blipFill>
         <p:spPr>
           <a:xfrm>
-            <a:off x="311700" y="1152475"/>
-            <a:ext cx="8520600" cy="3416400"/>
+            <a:off x="182879" y="1665230"/>
+            <a:ext cx="3402996" cy="1995920"/>
           </a:xfrm>
           <a:prstGeom prst="rect">
             <a:avLst/>
           </a:prstGeom>
         </p:spPr>
-        <p:txBody>
-          <a:bodyPr spcFirstLastPara="1" wrap="square" lIns="91425" tIns="91425" rIns="91425" bIns="91425" anchor="t" anchorCtr="0">
-            <a:normAutofit/>
-          </a:bodyPr>
-          <a:lstStyle/>
-          <a:p>
-            <a:pPr marL="0" lvl="0" indent="0" algn="l" rtl="0">
-              <a:spcBef>
-                <a:spcPts val="0"/>
-              </a:spcBef>
-              <a:spcAft>
-                <a:spcPts val="0"/>
-              </a:spcAft>
-              <a:buNone/>
-            </a:pPr>
-            <a:r>
-              <a:rPr lang="en"/>
-              <a:t>Feed Forward</a:t>
-            </a:r>
-            <a:endParaRPr/>
-          </a:p>
-          <a:p>
-            <a:pPr marL="0" lvl="0" indent="0" algn="l" rtl="0">
-              <a:spcBef>
-                <a:spcPts val="1200"/>
-              </a:spcBef>
-              <a:spcAft>
-                <a:spcPts val="1200"/>
-              </a:spcAft>
-              <a:buNone/>
-            </a:pPr>
-            <a:r>
-              <a:rPr lang="en"/>
-              <a:t>Recurrent</a:t>
-            </a:r>
-            <a:endParaRPr/>
-          </a:p>
-        </p:txBody>
-      </p:sp>
+      </p:pic>
+      <p:pic>
+        <p:nvPicPr>
+          <p:cNvPr id="6" name="Picture 5">
+            <a:extLst>
+              <a:ext uri="{FF2B5EF4-FFF2-40B4-BE49-F238E27FC236}">
+                <a16:creationId xmlns:a16="http://schemas.microsoft.com/office/drawing/2014/main" id="{F6416511-F7E5-4663-A5E4-B013B5346909}"/>
+              </a:ext>
+            </a:extLst>
+          </p:cNvPr>
+          <p:cNvPicPr>
+            <a:picLocks noChangeAspect="1"/>
+          </p:cNvPicPr>
+          <p:nvPr/>
+        </p:nvPicPr>
+        <p:blipFill>
+          <a:blip r:embed="rId6"/>
+          <a:stretch>
+            <a:fillRect/>
+          </a:stretch>
+        </p:blipFill>
+        <p:spPr>
+          <a:xfrm>
+            <a:off x="4221800" y="1422760"/>
+            <a:ext cx="4610500" cy="2568265"/>
+          </a:xfrm>
+          <a:prstGeom prst="rect">
+            <a:avLst/>
+          </a:prstGeom>
+        </p:spPr>
+      </p:pic>
     </p:spTree>
   </p:cSld>
   <p:clrMapOvr>

</xml_diff>